<commit_message>
CRTP files for tomorrow talk and big slides update
git-svn-id: https://svn.code.sf.net/p/cpp-lects-rus/code/trunk@170 39143b06-f351-456c-9f92-4cd32fad6823
</commit_message>
<xml_diff>
--- a/slides/lec2-1-function-templates.pptx
+++ b/slides/lec2-1-function-templates.pptx
@@ -50,7 +50,8 @@
     <p:sldId id="291" r:id="rId44"/>
     <p:sldId id="290" r:id="rId45"/>
     <p:sldId id="292" r:id="rId46"/>
-    <p:sldId id="293" r:id="rId47"/>
+    <p:sldId id="302" r:id="rId47"/>
+    <p:sldId id="293" r:id="rId48"/>
   </p:sldIdLst>
   <p:sldSz cx="12192000" cy="6858000"/>
   <p:notesSz cx="6858000" cy="9144000"/>
@@ -214,7 +215,7 @@
           <a:noFill/>
           <a:extLst>
             <a:ext uri="{909E8E84-426E-40dd-AFC4-6F175D3DCCD1}">
-              <a14:hiddenFill xmlns="" xmlns:a14="http://schemas.microsoft.com/office/drawing/2010/main">
+              <a14:hiddenFill xmlns:a14="http://schemas.microsoft.com/office/drawing/2010/main" xmlns="">
                 <a:solidFill>
                   <a:srgbClr val="FFFFFF"/>
                 </a:solidFill>
@@ -273,7 +274,7 @@
             </a:ln>
             <a:extLst>
               <a:ext uri="{91240B29-F687-4f45-9708-019B960494DF}">
-                <a14:hiddenLine xmlns="" xmlns:a14="http://schemas.microsoft.com/office/drawing/2010/main" w="9525">
+                <a14:hiddenLine xmlns:a14="http://schemas.microsoft.com/office/drawing/2010/main" xmlns="" w="9525">
                   <a:solidFill>
                     <a:srgbClr val="000000"/>
                   </a:solidFill>
@@ -363,7 +364,7 @@
             </a:ln>
             <a:extLst>
               <a:ext uri="{91240B29-F687-4f45-9708-019B960494DF}">
-                <a14:hiddenLine xmlns="" xmlns:a14="http://schemas.microsoft.com/office/drawing/2010/main" w="9525">
+                <a14:hiddenLine xmlns:a14="http://schemas.microsoft.com/office/drawing/2010/main" xmlns="" w="9525">
                   <a:solidFill>
                     <a:srgbClr val="000000"/>
                   </a:solidFill>
@@ -453,7 +454,7 @@
             </a:ln>
             <a:extLst>
               <a:ext uri="{91240B29-F687-4f45-9708-019B960494DF}">
-                <a14:hiddenLine xmlns="" xmlns:a14="http://schemas.microsoft.com/office/drawing/2010/main" w="9525">
+                <a14:hiddenLine xmlns:a14="http://schemas.microsoft.com/office/drawing/2010/main" xmlns="" w="9525">
                   <a:solidFill>
                     <a:srgbClr val="000000"/>
                   </a:solidFill>
@@ -487,7 +488,7 @@
             </a:ln>
             <a:extLst>
               <a:ext uri="{91240B29-F687-4f45-9708-019B960494DF}">
-                <a14:hiddenLine xmlns="" xmlns:a14="http://schemas.microsoft.com/office/drawing/2010/main" w="9525">
+                <a14:hiddenLine xmlns:a14="http://schemas.microsoft.com/office/drawing/2010/main" xmlns="" w="9525">
                   <a:solidFill>
                     <a:srgbClr val="000000"/>
                   </a:solidFill>
@@ -577,7 +578,7 @@
             </a:ln>
             <a:extLst>
               <a:ext uri="{91240B29-F687-4f45-9708-019B960494DF}">
-                <a14:hiddenLine xmlns="" xmlns:a14="http://schemas.microsoft.com/office/drawing/2010/main" w="9525">
+                <a14:hiddenLine xmlns:a14="http://schemas.microsoft.com/office/drawing/2010/main" xmlns="" w="9525">
                   <a:solidFill>
                     <a:srgbClr val="000000"/>
                   </a:solidFill>
@@ -639,7 +640,7 @@
             </a:ln>
             <a:extLst>
               <a:ext uri="{91240B29-F687-4f45-9708-019B960494DF}">
-                <a14:hiddenLine xmlns="" xmlns:a14="http://schemas.microsoft.com/office/drawing/2010/main" w="9525">
+                <a14:hiddenLine xmlns:a14="http://schemas.microsoft.com/office/drawing/2010/main" xmlns="" w="9525">
                   <a:solidFill>
                     <a:srgbClr val="000000"/>
                   </a:solidFill>
@@ -701,7 +702,7 @@
             </a:ln>
             <a:extLst>
               <a:ext uri="{91240B29-F687-4f45-9708-019B960494DF}">
-                <a14:hiddenLine xmlns="" xmlns:a14="http://schemas.microsoft.com/office/drawing/2010/main" w="9525">
+                <a14:hiddenLine xmlns:a14="http://schemas.microsoft.com/office/drawing/2010/main" xmlns="" w="9525">
                   <a:solidFill>
                     <a:srgbClr val="000000"/>
                   </a:solidFill>
@@ -791,7 +792,7 @@
             </a:ln>
             <a:extLst>
               <a:ext uri="{91240B29-F687-4f45-9708-019B960494DF}">
-                <a14:hiddenLine xmlns="" xmlns:a14="http://schemas.microsoft.com/office/drawing/2010/main" w="9525">
+                <a14:hiddenLine xmlns:a14="http://schemas.microsoft.com/office/drawing/2010/main" xmlns="" w="9525">
                   <a:solidFill>
                     <a:srgbClr val="000000"/>
                   </a:solidFill>
@@ -853,7 +854,7 @@
             </a:ln>
             <a:extLst>
               <a:ext uri="{91240B29-F687-4f45-9708-019B960494DF}">
-                <a14:hiddenLine xmlns="" xmlns:a14="http://schemas.microsoft.com/office/drawing/2010/main" w="9525">
+                <a14:hiddenLine xmlns:a14="http://schemas.microsoft.com/office/drawing/2010/main" xmlns="" w="9525">
                   <a:solidFill>
                     <a:srgbClr val="000000"/>
                   </a:solidFill>
@@ -915,7 +916,7 @@
             </a:ln>
             <a:extLst>
               <a:ext uri="{91240B29-F687-4f45-9708-019B960494DF}">
-                <a14:hiddenLine xmlns="" xmlns:a14="http://schemas.microsoft.com/office/drawing/2010/main" w="9525">
+                <a14:hiddenLine xmlns:a14="http://schemas.microsoft.com/office/drawing/2010/main" xmlns="" w="9525">
                   <a:solidFill>
                     <a:srgbClr val="000000"/>
                   </a:solidFill>
@@ -1005,7 +1006,7 @@
             </a:ln>
             <a:extLst>
               <a:ext uri="{91240B29-F687-4f45-9708-019B960494DF}">
-                <a14:hiddenLine xmlns="" xmlns:a14="http://schemas.microsoft.com/office/drawing/2010/main" w="9525">
+                <a14:hiddenLine xmlns:a14="http://schemas.microsoft.com/office/drawing/2010/main" xmlns="" w="9525">
                   <a:solidFill>
                     <a:srgbClr val="000000"/>
                   </a:solidFill>
@@ -1095,7 +1096,7 @@
             </a:ln>
             <a:extLst>
               <a:ext uri="{91240B29-F687-4f45-9708-019B960494DF}">
-                <a14:hiddenLine xmlns="" xmlns:a14="http://schemas.microsoft.com/office/drawing/2010/main" w="9525">
+                <a14:hiddenLine xmlns:a14="http://schemas.microsoft.com/office/drawing/2010/main" xmlns="" w="9525">
                   <a:solidFill>
                     <a:srgbClr val="000000"/>
                   </a:solidFill>
@@ -1157,7 +1158,7 @@
             </a:ln>
             <a:extLst>
               <a:ext uri="{91240B29-F687-4f45-9708-019B960494DF}">
-                <a14:hiddenLine xmlns="" xmlns:a14="http://schemas.microsoft.com/office/drawing/2010/main" w="9525">
+                <a14:hiddenLine xmlns:a14="http://schemas.microsoft.com/office/drawing/2010/main" xmlns="" w="9525">
                   <a:solidFill>
                     <a:srgbClr val="000000"/>
                   </a:solidFill>
@@ -1267,7 +1268,7 @@
             </a:ln>
             <a:extLst>
               <a:ext uri="{91240B29-F687-4f45-9708-019B960494DF}">
-                <a14:hiddenLine xmlns="" xmlns:a14="http://schemas.microsoft.com/office/drawing/2010/main" w="9525">
+                <a14:hiddenLine xmlns:a14="http://schemas.microsoft.com/office/drawing/2010/main" xmlns="" w="9525">
                   <a:solidFill>
                     <a:srgbClr val="000000"/>
                   </a:solidFill>
@@ -1329,7 +1330,7 @@
             </a:ln>
             <a:extLst>
               <a:ext uri="{91240B29-F687-4f45-9708-019B960494DF}">
-                <a14:hiddenLine xmlns="" xmlns:a14="http://schemas.microsoft.com/office/drawing/2010/main" w="9525">
+                <a14:hiddenLine xmlns:a14="http://schemas.microsoft.com/office/drawing/2010/main" xmlns="" w="9525">
                   <a:solidFill>
                     <a:srgbClr val="000000"/>
                   </a:solidFill>
@@ -1419,7 +1420,7 @@
             </a:ln>
             <a:extLst>
               <a:ext uri="{91240B29-F687-4f45-9708-019B960494DF}">
-                <a14:hiddenLine xmlns="" xmlns:a14="http://schemas.microsoft.com/office/drawing/2010/main" w="9525">
+                <a14:hiddenLine xmlns:a14="http://schemas.microsoft.com/office/drawing/2010/main" xmlns="" w="9525">
                   <a:solidFill>
                     <a:srgbClr val="000000"/>
                   </a:solidFill>
@@ -1509,7 +1510,7 @@
             </a:ln>
             <a:extLst>
               <a:ext uri="{91240B29-F687-4f45-9708-019B960494DF}">
-                <a14:hiddenLine xmlns="" xmlns:a14="http://schemas.microsoft.com/office/drawing/2010/main" w="9525">
+                <a14:hiddenLine xmlns:a14="http://schemas.microsoft.com/office/drawing/2010/main" xmlns="" w="9525">
                   <a:solidFill>
                     <a:srgbClr val="000000"/>
                   </a:solidFill>
@@ -1571,7 +1572,7 @@
             </a:ln>
             <a:extLst>
               <a:ext uri="{91240B29-F687-4f45-9708-019B960494DF}">
-                <a14:hiddenLine xmlns="" xmlns:a14="http://schemas.microsoft.com/office/drawing/2010/main" w="9525">
+                <a14:hiddenLine xmlns:a14="http://schemas.microsoft.com/office/drawing/2010/main" xmlns="" w="9525">
                   <a:solidFill>
                     <a:srgbClr val="000000"/>
                   </a:solidFill>
@@ -1661,7 +1662,7 @@
             </a:ln>
             <a:extLst>
               <a:ext uri="{91240B29-F687-4f45-9708-019B960494DF}">
-                <a14:hiddenLine xmlns="" xmlns:a14="http://schemas.microsoft.com/office/drawing/2010/main" w="9525">
+                <a14:hiddenLine xmlns:a14="http://schemas.microsoft.com/office/drawing/2010/main" xmlns="" w="9525">
                   <a:solidFill>
                     <a:srgbClr val="000000"/>
                   </a:solidFill>
@@ -1751,7 +1752,7 @@
             </a:ln>
             <a:extLst>
               <a:ext uri="{91240B29-F687-4f45-9708-019B960494DF}">
-                <a14:hiddenLine xmlns="" xmlns:a14="http://schemas.microsoft.com/office/drawing/2010/main" w="9525">
+                <a14:hiddenLine xmlns:a14="http://schemas.microsoft.com/office/drawing/2010/main" xmlns="" w="9525">
                   <a:solidFill>
                     <a:srgbClr val="000000"/>
                   </a:solidFill>
@@ -1807,7 +1808,7 @@
             </a:ln>
             <a:extLst>
               <a:ext uri="{91240B29-F687-4f45-9708-019B960494DF}">
-                <a14:hiddenLine xmlns="" xmlns:a14="http://schemas.microsoft.com/office/drawing/2010/main" w="9525">
+                <a14:hiddenLine xmlns:a14="http://schemas.microsoft.com/office/drawing/2010/main" xmlns="" w="9525">
                   <a:solidFill>
                     <a:srgbClr val="000000"/>
                   </a:solidFill>
@@ -1897,7 +1898,7 @@
             </a:ln>
             <a:extLst>
               <a:ext uri="{91240B29-F687-4f45-9708-019B960494DF}">
-                <a14:hiddenLine xmlns="" xmlns:a14="http://schemas.microsoft.com/office/drawing/2010/main" w="9525">
+                <a14:hiddenLine xmlns:a14="http://schemas.microsoft.com/office/drawing/2010/main" xmlns="" w="9525">
                   <a:solidFill>
                     <a:srgbClr val="000000"/>
                   </a:solidFill>
@@ -1953,7 +1954,7 @@
             </a:ln>
             <a:extLst>
               <a:ext uri="{91240B29-F687-4f45-9708-019B960494DF}">
-                <a14:hiddenLine xmlns="" xmlns:a14="http://schemas.microsoft.com/office/drawing/2010/main" w="9525">
+                <a14:hiddenLine xmlns:a14="http://schemas.microsoft.com/office/drawing/2010/main" xmlns="" w="9525">
                   <a:solidFill>
                     <a:srgbClr val="000000"/>
                   </a:solidFill>
@@ -2043,7 +2044,7 @@
             </a:ln>
             <a:extLst>
               <a:ext uri="{91240B29-F687-4f45-9708-019B960494DF}">
-                <a14:hiddenLine xmlns="" xmlns:a14="http://schemas.microsoft.com/office/drawing/2010/main" w="9525">
+                <a14:hiddenLine xmlns:a14="http://schemas.microsoft.com/office/drawing/2010/main" xmlns="" w="9525">
                   <a:solidFill>
                     <a:srgbClr val="000000"/>
                   </a:solidFill>
@@ -2111,7 +2112,7 @@
             </a:ln>
             <a:extLst>
               <a:ext uri="{91240B29-F687-4f45-9708-019B960494DF}">
-                <a14:hiddenLine xmlns="" xmlns:a14="http://schemas.microsoft.com/office/drawing/2010/main" w="9525">
+                <a14:hiddenLine xmlns:a14="http://schemas.microsoft.com/office/drawing/2010/main" xmlns="" w="9525">
                   <a:solidFill>
                     <a:srgbClr val="000000"/>
                   </a:solidFill>
@@ -2201,7 +2202,7 @@
             </a:ln>
             <a:extLst>
               <a:ext uri="{91240B29-F687-4f45-9708-019B960494DF}">
-                <a14:hiddenLine xmlns="" xmlns:a14="http://schemas.microsoft.com/office/drawing/2010/main" w="9525">
+                <a14:hiddenLine xmlns:a14="http://schemas.microsoft.com/office/drawing/2010/main" xmlns="" w="9525">
                   <a:solidFill>
                     <a:srgbClr val="000000"/>
                   </a:solidFill>
@@ -2269,7 +2270,7 @@
             </a:ln>
             <a:extLst>
               <a:ext uri="{91240B29-F687-4f45-9708-019B960494DF}">
-                <a14:hiddenLine xmlns="" xmlns:a14="http://schemas.microsoft.com/office/drawing/2010/main" w="9525">
+                <a14:hiddenLine xmlns:a14="http://schemas.microsoft.com/office/drawing/2010/main" xmlns="" w="9525">
                   <a:solidFill>
                     <a:srgbClr val="000000"/>
                   </a:solidFill>
@@ -2359,7 +2360,7 @@
             </a:ln>
             <a:extLst>
               <a:ext uri="{91240B29-F687-4f45-9708-019B960494DF}">
-                <a14:hiddenLine xmlns="" xmlns:a14="http://schemas.microsoft.com/office/drawing/2010/main" w="9525">
+                <a14:hiddenLine xmlns:a14="http://schemas.microsoft.com/office/drawing/2010/main" xmlns="" w="9525">
                   <a:solidFill>
                     <a:srgbClr val="000000"/>
                   </a:solidFill>
@@ -2393,7 +2394,7 @@
             </a:ln>
             <a:extLst>
               <a:ext uri="{91240B29-F687-4f45-9708-019B960494DF}">
-                <a14:hiddenLine xmlns="" xmlns:a14="http://schemas.microsoft.com/office/drawing/2010/main" w="9525">
+                <a14:hiddenLine xmlns:a14="http://schemas.microsoft.com/office/drawing/2010/main" xmlns="" w="9525">
                   <a:solidFill>
                     <a:srgbClr val="000000"/>
                   </a:solidFill>
@@ -2483,7 +2484,7 @@
             </a:ln>
             <a:extLst>
               <a:ext uri="{91240B29-F687-4f45-9708-019B960494DF}">
-                <a14:hiddenLine xmlns="" xmlns:a14="http://schemas.microsoft.com/office/drawing/2010/main" w="9525">
+                <a14:hiddenLine xmlns:a14="http://schemas.microsoft.com/office/drawing/2010/main" xmlns="" w="9525">
                   <a:solidFill>
                     <a:srgbClr val="000000"/>
                   </a:solidFill>
@@ -2545,7 +2546,7 @@
             </a:ln>
             <a:extLst>
               <a:ext uri="{91240B29-F687-4f45-9708-019B960494DF}">
-                <a14:hiddenLine xmlns="" xmlns:a14="http://schemas.microsoft.com/office/drawing/2010/main" w="9525">
+                <a14:hiddenLine xmlns:a14="http://schemas.microsoft.com/office/drawing/2010/main" xmlns="" w="9525">
                   <a:solidFill>
                     <a:srgbClr val="000000"/>
                   </a:solidFill>
@@ -2607,7 +2608,7 @@
             </a:ln>
             <a:extLst>
               <a:ext uri="{91240B29-F687-4f45-9708-019B960494DF}">
-                <a14:hiddenLine xmlns="" xmlns:a14="http://schemas.microsoft.com/office/drawing/2010/main" w="9525">
+                <a14:hiddenLine xmlns:a14="http://schemas.microsoft.com/office/drawing/2010/main" xmlns="" w="9525">
                   <a:solidFill>
                     <a:srgbClr val="000000"/>
                   </a:solidFill>
@@ -2697,7 +2698,7 @@
             </a:ln>
             <a:extLst>
               <a:ext uri="{91240B29-F687-4f45-9708-019B960494DF}">
-                <a14:hiddenLine xmlns="" xmlns:a14="http://schemas.microsoft.com/office/drawing/2010/main" w="9525">
+                <a14:hiddenLine xmlns:a14="http://schemas.microsoft.com/office/drawing/2010/main" xmlns="" w="9525">
                   <a:solidFill>
                     <a:srgbClr val="000000"/>
                   </a:solidFill>
@@ -2765,7 +2766,7 @@
             </a:ln>
             <a:extLst>
               <a:ext uri="{91240B29-F687-4f45-9708-019B960494DF}">
-                <a14:hiddenLine xmlns="" xmlns:a14="http://schemas.microsoft.com/office/drawing/2010/main" w="9525">
+                <a14:hiddenLine xmlns:a14="http://schemas.microsoft.com/office/drawing/2010/main" xmlns="" w="9525">
                   <a:solidFill>
                     <a:srgbClr val="000000"/>
                   </a:solidFill>
@@ -2827,7 +2828,7 @@
             </a:ln>
             <a:extLst>
               <a:ext uri="{91240B29-F687-4f45-9708-019B960494DF}">
-                <a14:hiddenLine xmlns="" xmlns:a14="http://schemas.microsoft.com/office/drawing/2010/main" w="9525">
+                <a14:hiddenLine xmlns:a14="http://schemas.microsoft.com/office/drawing/2010/main" xmlns="" w="9525">
                   <a:solidFill>
                     <a:srgbClr val="000000"/>
                   </a:solidFill>
@@ -2917,7 +2918,7 @@
             </a:ln>
             <a:extLst>
               <a:ext uri="{91240B29-F687-4f45-9708-019B960494DF}">
-                <a14:hiddenLine xmlns="" xmlns:a14="http://schemas.microsoft.com/office/drawing/2010/main" w="9525">
+                <a14:hiddenLine xmlns:a14="http://schemas.microsoft.com/office/drawing/2010/main" xmlns="" w="9525">
                   <a:solidFill>
                     <a:srgbClr val="000000"/>
                   </a:solidFill>
@@ -2979,7 +2980,7 @@
             </a:ln>
             <a:extLst>
               <a:ext uri="{91240B29-F687-4f45-9708-019B960494DF}">
-                <a14:hiddenLine xmlns="" xmlns:a14="http://schemas.microsoft.com/office/drawing/2010/main" w="9525">
+                <a14:hiddenLine xmlns:a14="http://schemas.microsoft.com/office/drawing/2010/main" xmlns="" w="9525">
                   <a:solidFill>
                     <a:srgbClr val="000000"/>
                   </a:solidFill>
@@ -3069,7 +3070,7 @@
             </a:ln>
             <a:extLst>
               <a:ext uri="{91240B29-F687-4f45-9708-019B960494DF}">
-                <a14:hiddenLine xmlns="" xmlns:a14="http://schemas.microsoft.com/office/drawing/2010/main" w="9525">
+                <a14:hiddenLine xmlns:a14="http://schemas.microsoft.com/office/drawing/2010/main" xmlns="" w="9525">
                   <a:solidFill>
                     <a:srgbClr val="000000"/>
                   </a:solidFill>
@@ -3131,7 +3132,7 @@
             </a:ln>
             <a:extLst>
               <a:ext uri="{91240B29-F687-4f45-9708-019B960494DF}">
-                <a14:hiddenLine xmlns="" xmlns:a14="http://schemas.microsoft.com/office/drawing/2010/main" w="9525">
+                <a14:hiddenLine xmlns:a14="http://schemas.microsoft.com/office/drawing/2010/main" xmlns="" w="9525">
                   <a:solidFill>
                     <a:srgbClr val="000000"/>
                   </a:solidFill>
@@ -3221,7 +3222,7 @@
             </a:ln>
             <a:extLst>
               <a:ext uri="{91240B29-F687-4f45-9708-019B960494DF}">
-                <a14:hiddenLine xmlns="" xmlns:a14="http://schemas.microsoft.com/office/drawing/2010/main" w="9525">
+                <a14:hiddenLine xmlns:a14="http://schemas.microsoft.com/office/drawing/2010/main" xmlns="" w="9525">
                   <a:solidFill>
                     <a:srgbClr val="000000"/>
                   </a:solidFill>
@@ -3255,7 +3256,7 @@
             </a:ln>
             <a:extLst>
               <a:ext uri="{91240B29-F687-4f45-9708-019B960494DF}">
-                <a14:hiddenLine xmlns="" xmlns:a14="http://schemas.microsoft.com/office/drawing/2010/main" w="9525">
+                <a14:hiddenLine xmlns:a14="http://schemas.microsoft.com/office/drawing/2010/main" xmlns="" w="9525">
                   <a:solidFill>
                     <a:srgbClr val="000000"/>
                   </a:solidFill>
@@ -3320,7 +3321,7 @@
             </a:ln>
             <a:extLst>
               <a:ext uri="{91240B29-F687-4f45-9708-019B960494DF}">
-                <a14:hiddenLine xmlns="" xmlns:a14="http://schemas.microsoft.com/office/drawing/2010/main" w="9525">
+                <a14:hiddenLine xmlns:a14="http://schemas.microsoft.com/office/drawing/2010/main" xmlns="" w="9525">
                   <a:solidFill>
                     <a:srgbClr val="000000"/>
                   </a:solidFill>
@@ -3410,7 +3411,7 @@
             </a:ln>
             <a:extLst>
               <a:ext uri="{91240B29-F687-4f45-9708-019B960494DF}">
-                <a14:hiddenLine xmlns="" xmlns:a14="http://schemas.microsoft.com/office/drawing/2010/main" w="9525">
+                <a14:hiddenLine xmlns:a14="http://schemas.microsoft.com/office/drawing/2010/main" xmlns="" w="9525">
                   <a:solidFill>
                     <a:srgbClr val="000000"/>
                   </a:solidFill>
@@ -3472,7 +3473,7 @@
             </a:ln>
             <a:extLst>
               <a:ext uri="{91240B29-F687-4f45-9708-019B960494DF}">
-                <a14:hiddenLine xmlns="" xmlns:a14="http://schemas.microsoft.com/office/drawing/2010/main" w="9525">
+                <a14:hiddenLine xmlns:a14="http://schemas.microsoft.com/office/drawing/2010/main" xmlns="" w="9525">
                   <a:solidFill>
                     <a:srgbClr val="000000"/>
                   </a:solidFill>
@@ -3562,7 +3563,7 @@
             </a:ln>
             <a:extLst>
               <a:ext uri="{91240B29-F687-4f45-9708-019B960494DF}">
-                <a14:hiddenLine xmlns="" xmlns:a14="http://schemas.microsoft.com/office/drawing/2010/main" w="9525">
+                <a14:hiddenLine xmlns:a14="http://schemas.microsoft.com/office/drawing/2010/main" xmlns="" w="9525">
                   <a:solidFill>
                     <a:srgbClr val="000000"/>
                   </a:solidFill>
@@ -3652,7 +3653,7 @@
             </a:ln>
             <a:extLst>
               <a:ext uri="{91240B29-F687-4f45-9708-019B960494DF}">
-                <a14:hiddenLine xmlns="" xmlns:a14="http://schemas.microsoft.com/office/drawing/2010/main" w="9525">
+                <a14:hiddenLine xmlns:a14="http://schemas.microsoft.com/office/drawing/2010/main" xmlns="" w="9525">
                   <a:solidFill>
                     <a:srgbClr val="000000"/>
                   </a:solidFill>
@@ -3717,7 +3718,7 @@
             </a:ln>
             <a:extLst>
               <a:ext uri="{91240B29-F687-4f45-9708-019B960494DF}">
-                <a14:hiddenLine xmlns="" xmlns:a14="http://schemas.microsoft.com/office/drawing/2010/main" w="9525">
+                <a14:hiddenLine xmlns:a14="http://schemas.microsoft.com/office/drawing/2010/main" xmlns="" w="9525">
                   <a:solidFill>
                     <a:srgbClr val="000000"/>
                   </a:solidFill>
@@ -3779,7 +3780,7 @@
             </a:ln>
             <a:extLst>
               <a:ext uri="{91240B29-F687-4f45-9708-019B960494DF}">
-                <a14:hiddenLine xmlns="" xmlns:a14="http://schemas.microsoft.com/office/drawing/2010/main" w="9525">
+                <a14:hiddenLine xmlns:a14="http://schemas.microsoft.com/office/drawing/2010/main" xmlns="" w="9525">
                   <a:solidFill>
                     <a:srgbClr val="000000"/>
                   </a:solidFill>
@@ -3869,7 +3870,7 @@
             </a:ln>
             <a:extLst>
               <a:ext uri="{91240B29-F687-4f45-9708-019B960494DF}">
-                <a14:hiddenLine xmlns="" xmlns:a14="http://schemas.microsoft.com/office/drawing/2010/main" w="9525">
+                <a14:hiddenLine xmlns:a14="http://schemas.microsoft.com/office/drawing/2010/main" xmlns="" w="9525">
                   <a:solidFill>
                     <a:srgbClr val="000000"/>
                   </a:solidFill>
@@ -3959,7 +3960,7 @@
             </a:ln>
             <a:extLst>
               <a:ext uri="{91240B29-F687-4f45-9708-019B960494DF}">
-                <a14:hiddenLine xmlns="" xmlns:a14="http://schemas.microsoft.com/office/drawing/2010/main" w="9525">
+                <a14:hiddenLine xmlns:a14="http://schemas.microsoft.com/office/drawing/2010/main" xmlns="" w="9525">
                   <a:solidFill>
                     <a:srgbClr val="000000"/>
                   </a:solidFill>
@@ -4021,7 +4022,7 @@
             </a:ln>
             <a:extLst>
               <a:ext uri="{91240B29-F687-4f45-9708-019B960494DF}">
-                <a14:hiddenLine xmlns="" xmlns:a14="http://schemas.microsoft.com/office/drawing/2010/main" w="9525">
+                <a14:hiddenLine xmlns:a14="http://schemas.microsoft.com/office/drawing/2010/main" xmlns="" w="9525">
                   <a:solidFill>
                     <a:srgbClr val="000000"/>
                   </a:solidFill>
@@ -4141,7 +4142,7 @@
             </a:ln>
             <a:extLst>
               <a:ext uri="{91240B29-F687-4f45-9708-019B960494DF}">
-                <a14:hiddenLine xmlns="" xmlns:a14="http://schemas.microsoft.com/office/drawing/2010/main" w="9525">
+                <a14:hiddenLine xmlns:a14="http://schemas.microsoft.com/office/drawing/2010/main" xmlns="" w="9525">
                   <a:solidFill>
                     <a:srgbClr val="000000"/>
                   </a:solidFill>
@@ -4209,7 +4210,7 @@
             </a:ln>
             <a:extLst>
               <a:ext uri="{91240B29-F687-4f45-9708-019B960494DF}">
-                <a14:hiddenLine xmlns="" xmlns:a14="http://schemas.microsoft.com/office/drawing/2010/main" w="9525">
+                <a14:hiddenLine xmlns:a14="http://schemas.microsoft.com/office/drawing/2010/main" xmlns="" w="9525">
                   <a:solidFill>
                     <a:srgbClr val="000000"/>
                   </a:solidFill>
@@ -4299,7 +4300,7 @@
             </a:ln>
             <a:extLst>
               <a:ext uri="{91240B29-F687-4f45-9708-019B960494DF}">
-                <a14:hiddenLine xmlns="" xmlns:a14="http://schemas.microsoft.com/office/drawing/2010/main" w="9525">
+                <a14:hiddenLine xmlns:a14="http://schemas.microsoft.com/office/drawing/2010/main" xmlns="" w="9525">
                   <a:solidFill>
                     <a:srgbClr val="000000"/>
                   </a:solidFill>
@@ -4439,7 +4440,7 @@
           <a:p>
             <a:fld id="{48A87A34-81AB-432B-8DAE-1953F412C126}" type="datetimeFigureOut">
               <a:rPr lang="en-US" dirty="0"/>
-              <a:t>2/7/2017</a:t>
+              <a:t>2/14/2017</a:t>
             </a:fld>
             <a:endParaRPr lang="en-US" dirty="0"/>
           </a:p>
@@ -4701,7 +4702,7 @@
           <a:p>
             <a:fld id="{48A87A34-81AB-432B-8DAE-1953F412C126}" type="datetimeFigureOut">
               <a:rPr lang="en-US" dirty="0"/>
-              <a:t>2/7/2017</a:t>
+              <a:t>2/14/2017</a:t>
             </a:fld>
             <a:endParaRPr lang="en-US" dirty="0"/>
           </a:p>
@@ -4892,7 +4893,7 @@
           <a:p>
             <a:fld id="{48A87A34-81AB-432B-8DAE-1953F412C126}" type="datetimeFigureOut">
               <a:rPr lang="en-US" dirty="0"/>
-              <a:t>2/7/2017</a:t>
+              <a:t>2/14/2017</a:t>
             </a:fld>
             <a:endParaRPr lang="en-US" dirty="0"/>
           </a:p>
@@ -5150,7 +5151,7 @@
           <a:p>
             <a:fld id="{48A87A34-81AB-432B-8DAE-1953F412C126}" type="datetimeFigureOut">
               <a:rPr lang="en-US" dirty="0"/>
-              <a:t>2/7/2017</a:t>
+              <a:t>2/14/2017</a:t>
             </a:fld>
             <a:endParaRPr lang="en-US" dirty="0"/>
           </a:p>
@@ -5579,7 +5580,7 @@
           <a:p>
             <a:fld id="{48A87A34-81AB-432B-8DAE-1953F412C126}" type="datetimeFigureOut">
               <a:rPr lang="en-US" dirty="0"/>
-              <a:t>2/7/2017</a:t>
+              <a:t>2/14/2017</a:t>
             </a:fld>
             <a:endParaRPr lang="en-US" dirty="0"/>
           </a:p>
@@ -6120,7 +6121,7 @@
           <a:p>
             <a:fld id="{48A87A34-81AB-432B-8DAE-1953F412C126}" type="datetimeFigureOut">
               <a:rPr lang="en-US" dirty="0"/>
-              <a:t>2/7/2017</a:t>
+              <a:t>2/14/2017</a:t>
             </a:fld>
             <a:endParaRPr lang="en-US" dirty="0"/>
           </a:p>
@@ -6835,7 +6836,7 @@
           <a:p>
             <a:fld id="{48A87A34-81AB-432B-8DAE-1953F412C126}" type="datetimeFigureOut">
               <a:rPr lang="en-US" dirty="0"/>
-              <a:t>2/7/2017</a:t>
+              <a:t>2/14/2017</a:t>
             </a:fld>
             <a:endParaRPr lang="en-US" dirty="0"/>
           </a:p>
@@ -7000,7 +7001,7 @@
           <a:p>
             <a:fld id="{48A87A34-81AB-432B-8DAE-1953F412C126}" type="datetimeFigureOut">
               <a:rPr lang="en-US" dirty="0"/>
-              <a:t>2/7/2017</a:t>
+              <a:t>2/14/2017</a:t>
             </a:fld>
             <a:endParaRPr lang="en-US" dirty="0"/>
           </a:p>
@@ -7175,7 +7176,7 @@
           <a:p>
             <a:fld id="{48A87A34-81AB-432B-8DAE-1953F412C126}" type="datetimeFigureOut">
               <a:rPr lang="en-US" dirty="0"/>
-              <a:t>2/7/2017</a:t>
+              <a:t>2/14/2017</a:t>
             </a:fld>
             <a:endParaRPr lang="en-US" dirty="0"/>
           </a:p>
@@ -7340,7 +7341,7 @@
           <a:p>
             <a:fld id="{48A87A34-81AB-432B-8DAE-1953F412C126}" type="datetimeFigureOut">
               <a:rPr lang="en-US" dirty="0"/>
-              <a:t>2/7/2017</a:t>
+              <a:t>2/14/2017</a:t>
             </a:fld>
             <a:endParaRPr lang="en-US" dirty="0"/>
           </a:p>
@@ -7585,7 +7586,7 @@
           <a:p>
             <a:fld id="{48A87A34-81AB-432B-8DAE-1953F412C126}" type="datetimeFigureOut">
               <a:rPr lang="en-US" dirty="0"/>
-              <a:t>2/7/2017</a:t>
+              <a:t>2/14/2017</a:t>
             </a:fld>
             <a:endParaRPr lang="en-US" dirty="0"/>
           </a:p>
@@ -7812,7 +7813,7 @@
           <a:p>
             <a:fld id="{48A87A34-81AB-432B-8DAE-1953F412C126}" type="datetimeFigureOut">
               <a:rPr lang="en-US" dirty="0"/>
-              <a:t>2/7/2017</a:t>
+              <a:t>2/14/2017</a:t>
             </a:fld>
             <a:endParaRPr lang="en-US" dirty="0"/>
           </a:p>
@@ -8188,7 +8189,7 @@
           <a:p>
             <a:fld id="{48A87A34-81AB-432B-8DAE-1953F412C126}" type="datetimeFigureOut">
               <a:rPr lang="en-US" dirty="0"/>
-              <a:t>2/7/2017</a:t>
+              <a:t>2/14/2017</a:t>
             </a:fld>
             <a:endParaRPr lang="en-US" dirty="0"/>
           </a:p>
@@ -8301,7 +8302,7 @@
           <a:p>
             <a:fld id="{48A87A34-81AB-432B-8DAE-1953F412C126}" type="datetimeFigureOut">
               <a:rPr lang="en-US" dirty="0"/>
-              <a:t>2/7/2017</a:t>
+              <a:t>2/14/2017</a:t>
             </a:fld>
             <a:endParaRPr lang="en-US" dirty="0"/>
           </a:p>
@@ -8391,7 +8392,7 @@
           <a:p>
             <a:fld id="{48A87A34-81AB-432B-8DAE-1953F412C126}" type="datetimeFigureOut">
               <a:rPr lang="en-US" dirty="0"/>
-              <a:t>2/7/2017</a:t>
+              <a:t>2/14/2017</a:t>
             </a:fld>
             <a:endParaRPr lang="en-US" dirty="0"/>
           </a:p>
@@ -8635,7 +8636,7 @@
           <a:p>
             <a:fld id="{48A87A34-81AB-432B-8DAE-1953F412C126}" type="datetimeFigureOut">
               <a:rPr lang="en-US" dirty="0"/>
-              <a:t>2/7/2017</a:t>
+              <a:t>2/14/2017</a:t>
             </a:fld>
             <a:endParaRPr lang="en-US" dirty="0"/>
           </a:p>
@@ -8910,7 +8911,7 @@
           <a:p>
             <a:fld id="{48A87A34-81AB-432B-8DAE-1953F412C126}" type="datetimeFigureOut">
               <a:rPr lang="en-US" dirty="0"/>
-              <a:t>2/7/2017</a:t>
+              <a:t>2/14/2017</a:t>
             </a:fld>
             <a:endParaRPr lang="en-US" dirty="0"/>
           </a:p>
@@ -9028,7 +9029,7 @@
           <a:noFill/>
           <a:extLst>
             <a:ext uri="{909E8E84-426E-40dd-AFC4-6F175D3DCCD1}">
-              <a14:hiddenFill xmlns="" xmlns:a14="http://schemas.microsoft.com/office/drawing/2010/main">
+              <a14:hiddenFill xmlns:a14="http://schemas.microsoft.com/office/drawing/2010/main" xmlns="">
                 <a:solidFill>
                   <a:srgbClr val="FFFFFF"/>
                 </a:solidFill>
@@ -9102,7 +9103,7 @@
               </a:ln>
               <a:extLst>
                 <a:ext uri="{91240B29-F687-4f45-9708-019B960494DF}">
-                  <a14:hiddenLine xmlns="" xmlns:a14="http://schemas.microsoft.com/office/drawing/2010/main" w="9525">
+                  <a14:hiddenLine xmlns:a14="http://schemas.microsoft.com/office/drawing/2010/main" xmlns="" w="9525">
                     <a:solidFill>
                       <a:srgbClr val="000000"/>
                     </a:solidFill>
@@ -9192,7 +9193,7 @@
               </a:ln>
               <a:extLst>
                 <a:ext uri="{91240B29-F687-4f45-9708-019B960494DF}">
-                  <a14:hiddenLine xmlns="" xmlns:a14="http://schemas.microsoft.com/office/drawing/2010/main" w="9525">
+                  <a14:hiddenLine xmlns:a14="http://schemas.microsoft.com/office/drawing/2010/main" xmlns="" w="9525">
                     <a:solidFill>
                       <a:srgbClr val="000000"/>
                     </a:solidFill>
@@ -9282,7 +9283,7 @@
               </a:ln>
               <a:extLst>
                 <a:ext uri="{91240B29-F687-4f45-9708-019B960494DF}">
-                  <a14:hiddenLine xmlns="" xmlns:a14="http://schemas.microsoft.com/office/drawing/2010/main" w="9525">
+                  <a14:hiddenLine xmlns:a14="http://schemas.microsoft.com/office/drawing/2010/main" xmlns="" w="9525">
                     <a:solidFill>
                       <a:srgbClr val="000000"/>
                     </a:solidFill>
@@ -9344,7 +9345,7 @@
               </a:ln>
               <a:extLst>
                 <a:ext uri="{91240B29-F687-4f45-9708-019B960494DF}">
-                  <a14:hiddenLine xmlns="" xmlns:a14="http://schemas.microsoft.com/office/drawing/2010/main" w="9525">
+                  <a14:hiddenLine xmlns:a14="http://schemas.microsoft.com/office/drawing/2010/main" xmlns="" w="9525">
                     <a:solidFill>
                       <a:srgbClr val="000000"/>
                     </a:solidFill>
@@ -9434,7 +9435,7 @@
               </a:ln>
               <a:extLst>
                 <a:ext uri="{91240B29-F687-4f45-9708-019B960494DF}">
-                  <a14:hiddenLine xmlns="" xmlns:a14="http://schemas.microsoft.com/office/drawing/2010/main" w="9525">
+                  <a14:hiddenLine xmlns:a14="http://schemas.microsoft.com/office/drawing/2010/main" xmlns="" w="9525">
                     <a:solidFill>
                       <a:srgbClr val="000000"/>
                     </a:solidFill>
@@ -9496,7 +9497,7 @@
               </a:ln>
               <a:extLst>
                 <a:ext uri="{91240B29-F687-4f45-9708-019B960494DF}">
-                  <a14:hiddenLine xmlns="" xmlns:a14="http://schemas.microsoft.com/office/drawing/2010/main" w="9525">
+                  <a14:hiddenLine xmlns:a14="http://schemas.microsoft.com/office/drawing/2010/main" xmlns="" w="9525">
                     <a:solidFill>
                       <a:srgbClr val="000000"/>
                     </a:solidFill>
@@ -9558,7 +9559,7 @@
               </a:ln>
               <a:extLst>
                 <a:ext uri="{91240B29-F687-4f45-9708-019B960494DF}">
-                  <a14:hiddenLine xmlns="" xmlns:a14="http://schemas.microsoft.com/office/drawing/2010/main" w="9525">
+                  <a14:hiddenLine xmlns:a14="http://schemas.microsoft.com/office/drawing/2010/main" xmlns="" w="9525">
                     <a:solidFill>
                       <a:srgbClr val="000000"/>
                     </a:solidFill>
@@ -9648,7 +9649,7 @@
               </a:ln>
               <a:extLst>
                 <a:ext uri="{91240B29-F687-4f45-9708-019B960494DF}">
-                  <a14:hiddenLine xmlns="" xmlns:a14="http://schemas.microsoft.com/office/drawing/2010/main" w="9525">
+                  <a14:hiddenLine xmlns:a14="http://schemas.microsoft.com/office/drawing/2010/main" xmlns="" w="9525">
                     <a:solidFill>
                       <a:srgbClr val="000000"/>
                     </a:solidFill>
@@ -9738,7 +9739,7 @@
               </a:ln>
               <a:extLst>
                 <a:ext uri="{91240B29-F687-4f45-9708-019B960494DF}">
-                  <a14:hiddenLine xmlns="" xmlns:a14="http://schemas.microsoft.com/office/drawing/2010/main" w="9525">
+                  <a14:hiddenLine xmlns:a14="http://schemas.microsoft.com/office/drawing/2010/main" xmlns="" w="9525">
                     <a:solidFill>
                       <a:srgbClr val="000000"/>
                     </a:solidFill>
@@ -9800,7 +9801,7 @@
               </a:ln>
               <a:extLst>
                 <a:ext uri="{91240B29-F687-4f45-9708-019B960494DF}">
-                  <a14:hiddenLine xmlns="" xmlns:a14="http://schemas.microsoft.com/office/drawing/2010/main" w="9525">
+                  <a14:hiddenLine xmlns:a14="http://schemas.microsoft.com/office/drawing/2010/main" xmlns="" w="9525">
                     <a:solidFill>
                       <a:srgbClr val="000000"/>
                     </a:solidFill>
@@ -9910,7 +9911,7 @@
               </a:ln>
               <a:extLst>
                 <a:ext uri="{91240B29-F687-4f45-9708-019B960494DF}">
-                  <a14:hiddenLine xmlns="" xmlns:a14="http://schemas.microsoft.com/office/drawing/2010/main" w="9525">
+                  <a14:hiddenLine xmlns:a14="http://schemas.microsoft.com/office/drawing/2010/main" xmlns="" w="9525">
                     <a:solidFill>
                       <a:srgbClr val="000000"/>
                     </a:solidFill>
@@ -9994,7 +9995,7 @@
               </a:ln>
               <a:extLst>
                 <a:ext uri="{91240B29-F687-4f45-9708-019B960494DF}">
-                  <a14:hiddenLine xmlns="" xmlns:a14="http://schemas.microsoft.com/office/drawing/2010/main" w="9525">
+                  <a14:hiddenLine xmlns:a14="http://schemas.microsoft.com/office/drawing/2010/main" xmlns="" w="9525">
                     <a:solidFill>
                       <a:srgbClr val="000000"/>
                     </a:solidFill>
@@ -10056,7 +10057,7 @@
               </a:ln>
               <a:extLst>
                 <a:ext uri="{91240B29-F687-4f45-9708-019B960494DF}">
-                  <a14:hiddenLine xmlns="" xmlns:a14="http://schemas.microsoft.com/office/drawing/2010/main" w="9525">
+                  <a14:hiddenLine xmlns:a14="http://schemas.microsoft.com/office/drawing/2010/main" xmlns="" w="9525">
                     <a:solidFill>
                       <a:srgbClr val="000000"/>
                     </a:solidFill>
@@ -10118,7 +10119,7 @@
               </a:ln>
               <a:extLst>
                 <a:ext uri="{91240B29-F687-4f45-9708-019B960494DF}">
-                  <a14:hiddenLine xmlns="" xmlns:a14="http://schemas.microsoft.com/office/drawing/2010/main" w="9525">
+                  <a14:hiddenLine xmlns:a14="http://schemas.microsoft.com/office/drawing/2010/main" xmlns="" w="9525">
                     <a:solidFill>
                       <a:srgbClr val="000000"/>
                     </a:solidFill>
@@ -10208,7 +10209,7 @@
               </a:ln>
               <a:extLst>
                 <a:ext uri="{91240B29-F687-4f45-9708-019B960494DF}">
-                  <a14:hiddenLine xmlns="" xmlns:a14="http://schemas.microsoft.com/office/drawing/2010/main" w="9525">
+                  <a14:hiddenLine xmlns:a14="http://schemas.microsoft.com/office/drawing/2010/main" xmlns="" w="9525">
                     <a:solidFill>
                       <a:srgbClr val="000000"/>
                     </a:solidFill>
@@ -10242,7 +10243,7 @@
               </a:ln>
               <a:extLst>
                 <a:ext uri="{91240B29-F687-4f45-9708-019B960494DF}">
-                  <a14:hiddenLine xmlns="" xmlns:a14="http://schemas.microsoft.com/office/drawing/2010/main" w="9525">
+                  <a14:hiddenLine xmlns:a14="http://schemas.microsoft.com/office/drawing/2010/main" xmlns="" w="9525">
                     <a:solidFill>
                       <a:srgbClr val="000000"/>
                     </a:solidFill>
@@ -10307,7 +10308,7 @@
               </a:ln>
               <a:extLst>
                 <a:ext uri="{91240B29-F687-4f45-9708-019B960494DF}">
-                  <a14:hiddenLine xmlns="" xmlns:a14="http://schemas.microsoft.com/office/drawing/2010/main" w="9525">
+                  <a14:hiddenLine xmlns:a14="http://schemas.microsoft.com/office/drawing/2010/main" xmlns="" w="9525">
                     <a:solidFill>
                       <a:srgbClr val="000000"/>
                     </a:solidFill>
@@ -10397,7 +10398,7 @@
               </a:ln>
               <a:extLst>
                 <a:ext uri="{91240B29-F687-4f45-9708-019B960494DF}">
-                  <a14:hiddenLine xmlns="" xmlns:a14="http://schemas.microsoft.com/office/drawing/2010/main" w="9525">
+                  <a14:hiddenLine xmlns:a14="http://schemas.microsoft.com/office/drawing/2010/main" xmlns="" w="9525">
                     <a:solidFill>
                       <a:srgbClr val="000000"/>
                     </a:solidFill>
@@ -10459,7 +10460,7 @@
               </a:ln>
               <a:extLst>
                 <a:ext uri="{91240B29-F687-4f45-9708-019B960494DF}">
-                  <a14:hiddenLine xmlns="" xmlns:a14="http://schemas.microsoft.com/office/drawing/2010/main" w="9525">
+                  <a14:hiddenLine xmlns:a14="http://schemas.microsoft.com/office/drawing/2010/main" xmlns="" w="9525">
                     <a:solidFill>
                       <a:srgbClr val="000000"/>
                     </a:solidFill>
@@ -10549,7 +10550,7 @@
               </a:ln>
               <a:extLst>
                 <a:ext uri="{91240B29-F687-4f45-9708-019B960494DF}">
-                  <a14:hiddenLine xmlns="" xmlns:a14="http://schemas.microsoft.com/office/drawing/2010/main" w="9525">
+                  <a14:hiddenLine xmlns:a14="http://schemas.microsoft.com/office/drawing/2010/main" xmlns="" w="9525">
                     <a:solidFill>
                       <a:srgbClr val="000000"/>
                     </a:solidFill>
@@ -10614,7 +10615,7 @@
               </a:ln>
               <a:extLst>
                 <a:ext uri="{91240B29-F687-4f45-9708-019B960494DF}">
-                  <a14:hiddenLine xmlns="" xmlns:a14="http://schemas.microsoft.com/office/drawing/2010/main" w="9525">
+                  <a14:hiddenLine xmlns:a14="http://schemas.microsoft.com/office/drawing/2010/main" xmlns="" w="9525">
                     <a:solidFill>
                       <a:srgbClr val="000000"/>
                     </a:solidFill>
@@ -10676,7 +10677,7 @@
               </a:ln>
               <a:extLst>
                 <a:ext uri="{91240B29-F687-4f45-9708-019B960494DF}">
-                  <a14:hiddenLine xmlns="" xmlns:a14="http://schemas.microsoft.com/office/drawing/2010/main" w="9525">
+                  <a14:hiddenLine xmlns:a14="http://schemas.microsoft.com/office/drawing/2010/main" xmlns="" w="9525">
                     <a:solidFill>
                       <a:srgbClr val="000000"/>
                     </a:solidFill>
@@ -10766,7 +10767,7 @@
               </a:ln>
               <a:extLst>
                 <a:ext uri="{91240B29-F687-4f45-9708-019B960494DF}">
-                  <a14:hiddenLine xmlns="" xmlns:a14="http://schemas.microsoft.com/office/drawing/2010/main" w="9525">
+                  <a14:hiddenLine xmlns:a14="http://schemas.microsoft.com/office/drawing/2010/main" xmlns="" w="9525">
                     <a:solidFill>
                       <a:srgbClr val="000000"/>
                     </a:solidFill>
@@ -10856,7 +10857,7 @@
               </a:ln>
               <a:extLst>
                 <a:ext uri="{91240B29-F687-4f45-9708-019B960494DF}">
-                  <a14:hiddenLine xmlns="" xmlns:a14="http://schemas.microsoft.com/office/drawing/2010/main" w="9525">
+                  <a14:hiddenLine xmlns:a14="http://schemas.microsoft.com/office/drawing/2010/main" xmlns="" w="9525">
                     <a:solidFill>
                       <a:srgbClr val="000000"/>
                     </a:solidFill>
@@ -10921,7 +10922,7 @@
               </a:ln>
               <a:extLst>
                 <a:ext uri="{91240B29-F687-4f45-9708-019B960494DF}">
-                  <a14:hiddenLine xmlns="" xmlns:a14="http://schemas.microsoft.com/office/drawing/2010/main" w="9525">
+                  <a14:hiddenLine xmlns:a14="http://schemas.microsoft.com/office/drawing/2010/main" xmlns="" w="9525">
                     <a:solidFill>
                       <a:srgbClr val="000000"/>
                     </a:solidFill>
@@ -11041,7 +11042,7 @@
               </a:ln>
               <a:extLst>
                 <a:ext uri="{91240B29-F687-4f45-9708-019B960494DF}">
-                  <a14:hiddenLine xmlns="" xmlns:a14="http://schemas.microsoft.com/office/drawing/2010/main" w="9525">
+                  <a14:hiddenLine xmlns:a14="http://schemas.microsoft.com/office/drawing/2010/main" xmlns="" w="9525">
                     <a:solidFill>
                       <a:srgbClr val="000000"/>
                     </a:solidFill>
@@ -11122,7 +11123,7 @@
               </a:ln>
               <a:extLst>
                 <a:ext uri="{91240B29-F687-4f45-9708-019B960494DF}">
-                  <a14:hiddenLine xmlns="" xmlns:a14="http://schemas.microsoft.com/office/drawing/2010/main" w="9525">
+                  <a14:hiddenLine xmlns:a14="http://schemas.microsoft.com/office/drawing/2010/main" xmlns="" w="9525">
                     <a:solidFill>
                       <a:srgbClr val="000000"/>
                     </a:solidFill>
@@ -11237,7 +11238,7 @@
               </a:ln>
               <a:extLst>
                 <a:ext uri="{91240B29-F687-4f45-9708-019B960494DF}">
-                  <a14:hiddenLine xmlns="" xmlns:a14="http://schemas.microsoft.com/office/drawing/2010/main" w="9525">
+                  <a14:hiddenLine xmlns:a14="http://schemas.microsoft.com/office/drawing/2010/main" xmlns="" w="9525">
                     <a:solidFill>
                       <a:srgbClr val="000000"/>
                     </a:solidFill>
@@ -11327,7 +11328,7 @@
               </a:ln>
               <a:extLst>
                 <a:ext uri="{91240B29-F687-4f45-9708-019B960494DF}">
-                  <a14:hiddenLine xmlns="" xmlns:a14="http://schemas.microsoft.com/office/drawing/2010/main" w="9525">
+                  <a14:hiddenLine xmlns:a14="http://schemas.microsoft.com/office/drawing/2010/main" xmlns="" w="9525">
                     <a:solidFill>
                       <a:srgbClr val="000000"/>
                     </a:solidFill>
@@ -11392,7 +11393,7 @@
               </a:ln>
               <a:extLst>
                 <a:ext uri="{91240B29-F687-4f45-9708-019B960494DF}">
-                  <a14:hiddenLine xmlns="" xmlns:a14="http://schemas.microsoft.com/office/drawing/2010/main" w="9525">
+                  <a14:hiddenLine xmlns:a14="http://schemas.microsoft.com/office/drawing/2010/main" xmlns="" w="9525">
                     <a:solidFill>
                       <a:srgbClr val="000000"/>
                     </a:solidFill>
@@ -11482,7 +11483,7 @@
               </a:ln>
               <a:extLst>
                 <a:ext uri="{91240B29-F687-4f45-9708-019B960494DF}">
-                  <a14:hiddenLine xmlns="" xmlns:a14="http://schemas.microsoft.com/office/drawing/2010/main" w="9525">
+                  <a14:hiddenLine xmlns:a14="http://schemas.microsoft.com/office/drawing/2010/main" xmlns="" w="9525">
                     <a:solidFill>
                       <a:srgbClr val="000000"/>
                     </a:solidFill>
@@ -11550,7 +11551,7 @@
               </a:ln>
               <a:extLst>
                 <a:ext uri="{91240B29-F687-4f45-9708-019B960494DF}">
-                  <a14:hiddenLine xmlns="" xmlns:a14="http://schemas.microsoft.com/office/drawing/2010/main" w="9525">
+                  <a14:hiddenLine xmlns:a14="http://schemas.microsoft.com/office/drawing/2010/main" xmlns="" w="9525">
                     <a:solidFill>
                       <a:srgbClr val="000000"/>
                     </a:solidFill>
@@ -11640,7 +11641,7 @@
               </a:ln>
               <a:extLst>
                 <a:ext uri="{91240B29-F687-4f45-9708-019B960494DF}">
-                  <a14:hiddenLine xmlns="" xmlns:a14="http://schemas.microsoft.com/office/drawing/2010/main" w="9525">
+                  <a14:hiddenLine xmlns:a14="http://schemas.microsoft.com/office/drawing/2010/main" xmlns="" w="9525">
                     <a:solidFill>
                       <a:srgbClr val="000000"/>
                     </a:solidFill>
@@ -11708,7 +11709,7 @@
               </a:ln>
               <a:extLst>
                 <a:ext uri="{91240B29-F687-4f45-9708-019B960494DF}">
-                  <a14:hiddenLine xmlns="" xmlns:a14="http://schemas.microsoft.com/office/drawing/2010/main" w="9525">
+                  <a14:hiddenLine xmlns:a14="http://schemas.microsoft.com/office/drawing/2010/main" xmlns="" w="9525">
                     <a:solidFill>
                       <a:srgbClr val="000000"/>
                     </a:solidFill>
@@ -11798,7 +11799,7 @@
               </a:ln>
               <a:extLst>
                 <a:ext uri="{91240B29-F687-4f45-9708-019B960494DF}">
-                  <a14:hiddenLine xmlns="" xmlns:a14="http://schemas.microsoft.com/office/drawing/2010/main" w="9525">
+                  <a14:hiddenLine xmlns:a14="http://schemas.microsoft.com/office/drawing/2010/main" xmlns="" w="9525">
                     <a:solidFill>
                       <a:srgbClr val="000000"/>
                     </a:solidFill>
@@ -11832,7 +11833,7 @@
               </a:ln>
               <a:extLst>
                 <a:ext uri="{91240B29-F687-4f45-9708-019B960494DF}">
-                  <a14:hiddenLine xmlns="" xmlns:a14="http://schemas.microsoft.com/office/drawing/2010/main" w="9525">
+                  <a14:hiddenLine xmlns:a14="http://schemas.microsoft.com/office/drawing/2010/main" xmlns="" w="9525">
                     <a:solidFill>
                       <a:srgbClr val="000000"/>
                     </a:solidFill>
@@ -11973,7 +11974,7 @@
             <a:fld id="{48A87A34-81AB-432B-8DAE-1953F412C126}" type="datetimeFigureOut">
               <a:rPr lang="en-US" dirty="0"/>
               <a:pPr/>
-              <a:t>2/7/2017</a:t>
+              <a:t>2/14/2017</a:t>
             </a:fld>
             <a:endParaRPr lang="en-US" dirty="0"/>
           </a:p>
@@ -14589,8 +14590,8 @@
           </a:p>
         </p:txBody>
       </p:sp>
-      <mc:AlternateContent xmlns:mc="http://schemas.openxmlformats.org/markup-compatibility/2006">
-        <mc:Choice xmlns:a14="http://schemas.microsoft.com/office/drawing/2010/main" Requires="a14">
+      <mc:AlternateContent xmlns:mc="http://schemas.openxmlformats.org/markup-compatibility/2006" xmlns:a14="http://schemas.microsoft.com/office/drawing/2010/main">
+        <mc:Choice Requires="a14">
           <p:sp>
             <p:nvSpPr>
               <p:cNvPr id="4" name="Content Placeholder 2"/>
@@ -14978,7 +14979,7 @@
             </p:txBody>
           </p:sp>
         </mc:Choice>
-        <mc:Fallback>
+        <mc:Fallback xmlns="">
           <p:sp>
             <p:nvSpPr>
               <p:cNvPr id="4" name="Content Placeholder 2"/>
@@ -17809,7 +17810,7 @@
               <a:rPr lang="en-US" dirty="0" smtClean="0">
                 <a:latin typeface="Consolas" panose="020B0609020204030204" pitchFamily="49" charset="0"/>
               </a:rPr>
-              <a:t>&gt; </a:t>
+              <a:t>&gt; auto</a:t>
             </a:r>
             <a:r>
               <a:rPr lang="ru-RU" dirty="0" smtClean="0">
@@ -21309,13 +21310,7 @@
               <a:rPr lang="en-US" dirty="0" smtClean="0">
                 <a:latin typeface="Consolas" panose="020B0609020204030204" pitchFamily="49" charset="0"/>
               </a:rPr>
-              <a:t> </a:t>
-            </a:r>
-            <a:r>
-              <a:rPr lang="en-US" dirty="0" smtClean="0">
-                <a:latin typeface="Consolas" panose="020B0609020204030204" pitchFamily="49" charset="0"/>
-              </a:rPr>
-              <a:t>ref</a:t>
+              <a:t> ref</a:t>
             </a:r>
             <a:endParaRPr lang="ru-RU" dirty="0">
               <a:latin typeface="Consolas" panose="020B0609020204030204" pitchFamily="49" charset="0"/>
@@ -21571,12 +21566,6 @@
               </a:rPr>
               <a:t>;</a:t>
             </a:r>
-            <a:r>
-              <a:rPr lang="en-US" dirty="0" smtClean="0">
-                <a:latin typeface="Consolas" panose="020B0609020204030204" pitchFamily="49" charset="0"/>
-              </a:rPr>
-              <a:t/>
-            </a:r>
             <a:br>
               <a:rPr lang="en-US" dirty="0" smtClean="0">
                 <a:latin typeface="Consolas" panose="020B0609020204030204" pitchFamily="49" charset="0"/>
@@ -21664,9 +21653,6 @@
               </a:rPr>
               <a:t>конструктор сгенерирован</a:t>
             </a:r>
-            <a:endParaRPr lang="ru-RU" dirty="0" smtClean="0">
-              <a:latin typeface="Consolas" panose="020B0609020204030204" pitchFamily="49" charset="0"/>
-            </a:endParaRPr>
           </a:p>
         </p:txBody>
       </p:sp>
@@ -21892,12 +21878,6 @@
               </a:rPr>
               <a:t>;</a:t>
             </a:r>
-            <a:r>
-              <a:rPr lang="en-US" dirty="0" smtClean="0">
-                <a:latin typeface="Consolas" panose="020B0609020204030204" pitchFamily="49" charset="0"/>
-              </a:rPr>
-              <a:t/>
-            </a:r>
             <a:br>
               <a:rPr lang="en-US" dirty="0" smtClean="0">
                 <a:latin typeface="Consolas" panose="020B0609020204030204" pitchFamily="49" charset="0"/>
@@ -22146,13 +22126,7 @@
               <a:rPr lang="en-US" dirty="0" smtClean="0">
                 <a:latin typeface="Consolas" panose="020B0609020204030204" pitchFamily="49" charset="0"/>
               </a:rPr>
-              <a:t> T&gt; Person (T &amp;&amp;</a:t>
-            </a:r>
-            <a:r>
-              <a:rPr lang="en-US" dirty="0" smtClean="0">
-                <a:latin typeface="Consolas" panose="020B0609020204030204" pitchFamily="49" charset="0"/>
-              </a:rPr>
-              <a:t>name) :</a:t>
+              <a:t> T&gt; Person (T &amp;&amp;name) :</a:t>
             </a:r>
             <a:br>
               <a:rPr lang="en-US" dirty="0" smtClean="0">
@@ -22175,7 +22149,7 @@
               <a:rPr lang="en-US" dirty="0" smtClean="0">
                 <a:latin typeface="Consolas" panose="020B0609020204030204" pitchFamily="49" charset="0"/>
               </a:rPr>
-              <a:t>::forward(name)) {}</a:t>
+              <a:t>::forward&lt;T&gt;(name)) {}</a:t>
             </a:r>
             <a:br>
               <a:rPr lang="en-US" dirty="0" smtClean="0">
@@ -22287,15 +22261,6 @@
               </a:rPr>
               <a:t>увы, теперь это не работает</a:t>
             </a:r>
-            <a:endParaRPr lang="ru-RU" dirty="0" smtClean="0">
-              <a:solidFill>
-                <a:schemeClr val="accent3">
-                  <a:lumMod val="60000"/>
-                  <a:lumOff val="40000"/>
-                </a:schemeClr>
-              </a:solidFill>
-              <a:latin typeface="Consolas" panose="020B0609020204030204" pitchFamily="49" charset="0"/>
-            </a:endParaRPr>
           </a:p>
           <a:p>
             <a:pPr marL="0" lvl="0" indent="0" algn="ctr">
@@ -22310,12 +22275,6 @@
               </a:rPr>
               <a:t>Но прошлый вариант ТОЖЕ плох. Что же делать?</a:t>
             </a:r>
-            <a:endParaRPr lang="ru-RU" dirty="0" smtClean="0">
-              <a:solidFill>
-                <a:srgbClr val="FFFF00"/>
-              </a:solidFill>
-              <a:latin typeface="Consolas" panose="020B0609020204030204" pitchFamily="49" charset="0"/>
-            </a:endParaRPr>
           </a:p>
         </p:txBody>
       </p:sp>
@@ -22445,13 +22404,7 @@
               <a:rPr lang="en-US" dirty="0" smtClean="0">
                 <a:latin typeface="Consolas" panose="020B0609020204030204" pitchFamily="49" charset="0"/>
               </a:rPr>
-              <a:t>Person (</a:t>
-            </a:r>
-            <a:r>
-              <a:rPr lang="en-US" dirty="0" smtClean="0">
-                <a:latin typeface="Consolas" panose="020B0609020204030204" pitchFamily="49" charset="0"/>
-              </a:rPr>
-              <a:t>string name) : name_(</a:t>
+              <a:t>Person (string name) : name_(</a:t>
             </a:r>
             <a:r>
               <a:rPr lang="en-US" dirty="0" err="1" smtClean="0">
@@ -22829,19 +22782,7 @@
               <a:rPr lang="ru-RU" dirty="0" smtClean="0">
                 <a:latin typeface="Consolas" panose="020B0609020204030204" pitchFamily="49" charset="0"/>
               </a:rPr>
-              <a:t> (и почему ее следует избегать) </a:t>
-            </a:r>
-            <a:r>
-              <a:rPr lang="ru-RU" dirty="0" smtClean="0">
-                <a:latin typeface="Consolas" panose="020B0609020204030204" pitchFamily="49" charset="0"/>
-              </a:rPr>
-              <a:t>более подробно описана </a:t>
-            </a:r>
-            <a:r>
-              <a:rPr lang="ru-RU" dirty="0" smtClean="0">
-                <a:latin typeface="Consolas" panose="020B0609020204030204" pitchFamily="49" charset="0"/>
-              </a:rPr>
-              <a:t>у Майерса</a:t>
+              <a:t> (и почему ее следует избегать) более подробно описана у Майерса</a:t>
             </a:r>
             <a:endParaRPr lang="en-US" dirty="0"/>
           </a:p>
@@ -25581,8 +25522,8 @@
               <a:t>cpp_code</a:t>
             </a:r>
             <a:r>
-              <a:rPr lang="en-US" dirty="0" smtClean="0"/>
-              <a:t>/lect2-01-talk</a:t>
+              <a:rPr lang="en-US" smtClean="0"/>
+              <a:t>/lect2-1-talk/</a:t>
             </a:r>
             <a:endParaRPr lang="ru-RU" dirty="0" smtClean="0"/>
           </a:p>
@@ -25602,6 +25543,183 @@
 </file>
 
 <file path=ppt/slides/slide46.xml><?xml version="1.0" encoding="utf-8"?>
+<p:sld xmlns:a="http://schemas.openxmlformats.org/drawingml/2006/main" xmlns:r="http://schemas.openxmlformats.org/officeDocument/2006/relationships" xmlns:p="http://schemas.openxmlformats.org/presentationml/2006/main">
+  <p:cSld>
+    <p:spTree>
+      <p:nvGrpSpPr>
+        <p:cNvPr id="1" name=""/>
+        <p:cNvGrpSpPr/>
+        <p:nvPr/>
+      </p:nvGrpSpPr>
+      <p:grpSpPr>
+        <a:xfrm>
+          <a:off x="0" y="0"/>
+          <a:ext cx="0" cy="0"/>
+          <a:chOff x="0" y="0"/>
+          <a:chExt cx="0" cy="0"/>
+        </a:xfrm>
+      </p:grpSpPr>
+      <p:sp>
+        <p:nvSpPr>
+          <p:cNvPr id="4" name="Title 3"/>
+          <p:cNvSpPr>
+            <a:spLocks noGrp="1"/>
+          </p:cNvSpPr>
+          <p:nvPr>
+            <p:ph type="title"/>
+          </p:nvPr>
+        </p:nvSpPr>
+        <p:spPr/>
+        <p:txBody>
+          <a:bodyPr>
+            <a:normAutofit/>
+          </a:bodyPr>
+          <a:lstStyle/>
+          <a:p>
+            <a:r>
+              <a:rPr lang="ru-RU" dirty="0" smtClean="0"/>
+              <a:t>демонстрация инстанцирования</a:t>
+            </a:r>
+            <a:endParaRPr lang="en-US" dirty="0"/>
+          </a:p>
+        </p:txBody>
+      </p:sp>
+      <p:sp>
+        <p:nvSpPr>
+          <p:cNvPr id="2" name="Content Placeholder 1"/>
+          <p:cNvSpPr>
+            <a:spLocks noGrp="1"/>
+          </p:cNvSpPr>
+          <p:nvPr>
+            <p:ph idx="1"/>
+          </p:nvPr>
+        </p:nvSpPr>
+        <p:spPr/>
+        <p:txBody>
+          <a:bodyPr/>
+          <a:lstStyle/>
+          <a:p>
+            <a:pPr marL="0" indent="0">
+              <a:buNone/>
+            </a:pPr>
+            <a:r>
+              <a:rPr lang="ru-RU" dirty="0" smtClean="0"/>
+              <a:t>Основная идея в том, что инстанцирование можно как явно запретить:</a:t>
+            </a:r>
+          </a:p>
+          <a:p>
+            <a:pPr marL="0" indent="0">
+              <a:buNone/>
+            </a:pPr>
+            <a:r>
+              <a:rPr lang="en-US" dirty="0"/>
+              <a:t>extern template </a:t>
+            </a:r>
+            <a:r>
+              <a:rPr lang="en-US" dirty="0" err="1"/>
+              <a:t>int</a:t>
+            </a:r>
+            <a:r>
+              <a:rPr lang="en-US" dirty="0"/>
+              <a:t> max&lt;</a:t>
+            </a:r>
+            <a:r>
+              <a:rPr lang="en-US" dirty="0" err="1"/>
+              <a:t>int</a:t>
+            </a:r>
+            <a:r>
+              <a:rPr lang="en-US" dirty="0"/>
+              <a:t>&gt; (</a:t>
+            </a:r>
+            <a:r>
+              <a:rPr lang="en-US" dirty="0" err="1"/>
+              <a:t>int</a:t>
+            </a:r>
+            <a:r>
+              <a:rPr lang="en-US" dirty="0"/>
+              <a:t>, </a:t>
+            </a:r>
+            <a:r>
+              <a:rPr lang="en-US" dirty="0" err="1"/>
+              <a:t>int</a:t>
+            </a:r>
+            <a:r>
+              <a:rPr lang="en-US" dirty="0" smtClean="0"/>
+              <a:t>);</a:t>
+            </a:r>
+            <a:endParaRPr lang="ru-RU" dirty="0" smtClean="0"/>
+          </a:p>
+          <a:p>
+            <a:pPr marL="0" indent="0">
+              <a:buNone/>
+            </a:pPr>
+            <a:r>
+              <a:rPr lang="ru-RU" dirty="0" smtClean="0"/>
+              <a:t>так и явно задать:</a:t>
+            </a:r>
+          </a:p>
+          <a:p>
+            <a:pPr marL="0" indent="0">
+              <a:buNone/>
+            </a:pPr>
+            <a:r>
+              <a:rPr lang="fr-FR" dirty="0" err="1"/>
+              <a:t>template</a:t>
+            </a:r>
+            <a:r>
+              <a:rPr lang="fr-FR" dirty="0"/>
+              <a:t> </a:t>
+            </a:r>
+            <a:r>
+              <a:rPr lang="fr-FR" dirty="0" err="1"/>
+              <a:t>int</a:t>
+            </a:r>
+            <a:r>
+              <a:rPr lang="fr-FR" dirty="0"/>
+              <a:t> max&lt;</a:t>
+            </a:r>
+            <a:r>
+              <a:rPr lang="fr-FR" dirty="0" err="1"/>
+              <a:t>int</a:t>
+            </a:r>
+            <a:r>
+              <a:rPr lang="fr-FR" dirty="0"/>
+              <a:t>&gt;(</a:t>
+            </a:r>
+            <a:r>
+              <a:rPr lang="fr-FR" dirty="0" err="1"/>
+              <a:t>int</a:t>
+            </a:r>
+            <a:r>
+              <a:rPr lang="fr-FR" dirty="0"/>
+              <a:t>, </a:t>
+            </a:r>
+            <a:r>
+              <a:rPr lang="fr-FR" dirty="0" err="1"/>
+              <a:t>int</a:t>
+            </a:r>
+            <a:r>
+              <a:rPr lang="fr-FR" dirty="0"/>
+              <a:t>);</a:t>
+            </a:r>
+            <a:endParaRPr lang="en-US" dirty="0"/>
+          </a:p>
+        </p:txBody>
+      </p:sp>
+    </p:spTree>
+    <p:extLst>
+      <p:ext uri="{BB962C8B-B14F-4D97-AF65-F5344CB8AC3E}">
+        <p14:creationId xmlns:p14="http://schemas.microsoft.com/office/powerpoint/2010/main" val="3421192955"/>
+      </p:ext>
+    </p:extLst>
+  </p:cSld>
+  <p:clrMapOvr>
+    <a:masterClrMapping/>
+  </p:clrMapOvr>
+</p:sld>
+</file>
+
+<file path=ppt/slides/slide47.xml><?xml version="1.0" encoding="utf-8"?>
 <p:sld xmlns:a="http://schemas.openxmlformats.org/drawingml/2006/main" xmlns:r="http://schemas.openxmlformats.org/officeDocument/2006/relationships" xmlns:p="http://schemas.openxmlformats.org/presentationml/2006/main">
   <p:cSld>
     <p:spTree>

</xml_diff>

<commit_message>
Adding iterator lecture project and massive update of others
git-svn-id: https://svn.code.sf.net/p/cpp-lects-rus/code/trunk@192 39143b06-f351-456c-9f92-4cd32fad6823
</commit_message>
<xml_diff>
--- a/slides/lec2-1-function-templates.pptx
+++ b/slides/lec2-1-function-templates.pptx
@@ -215,7 +215,7 @@
           <a:noFill/>
           <a:extLst>
             <a:ext uri="{909E8E84-426E-40dd-AFC4-6F175D3DCCD1}">
-              <a14:hiddenFill xmlns:a14="http://schemas.microsoft.com/office/drawing/2010/main" xmlns="">
+              <a14:hiddenFill xmlns="" xmlns:a14="http://schemas.microsoft.com/office/drawing/2010/main">
                 <a:solidFill>
                   <a:srgbClr val="FFFFFF"/>
                 </a:solidFill>
@@ -274,7 +274,7 @@
             </a:ln>
             <a:extLst>
               <a:ext uri="{91240B29-F687-4f45-9708-019B960494DF}">
-                <a14:hiddenLine xmlns:a14="http://schemas.microsoft.com/office/drawing/2010/main" xmlns="" w="9525">
+                <a14:hiddenLine xmlns="" xmlns:a14="http://schemas.microsoft.com/office/drawing/2010/main" w="9525">
                   <a:solidFill>
                     <a:srgbClr val="000000"/>
                   </a:solidFill>
@@ -364,7 +364,7 @@
             </a:ln>
             <a:extLst>
               <a:ext uri="{91240B29-F687-4f45-9708-019B960494DF}">
-                <a14:hiddenLine xmlns:a14="http://schemas.microsoft.com/office/drawing/2010/main" xmlns="" w="9525">
+                <a14:hiddenLine xmlns="" xmlns:a14="http://schemas.microsoft.com/office/drawing/2010/main" w="9525">
                   <a:solidFill>
                     <a:srgbClr val="000000"/>
                   </a:solidFill>
@@ -454,7 +454,7 @@
             </a:ln>
             <a:extLst>
               <a:ext uri="{91240B29-F687-4f45-9708-019B960494DF}">
-                <a14:hiddenLine xmlns:a14="http://schemas.microsoft.com/office/drawing/2010/main" xmlns="" w="9525">
+                <a14:hiddenLine xmlns="" xmlns:a14="http://schemas.microsoft.com/office/drawing/2010/main" w="9525">
                   <a:solidFill>
                     <a:srgbClr val="000000"/>
                   </a:solidFill>
@@ -488,7 +488,7 @@
             </a:ln>
             <a:extLst>
               <a:ext uri="{91240B29-F687-4f45-9708-019B960494DF}">
-                <a14:hiddenLine xmlns:a14="http://schemas.microsoft.com/office/drawing/2010/main" xmlns="" w="9525">
+                <a14:hiddenLine xmlns="" xmlns:a14="http://schemas.microsoft.com/office/drawing/2010/main" w="9525">
                   <a:solidFill>
                     <a:srgbClr val="000000"/>
                   </a:solidFill>
@@ -578,7 +578,7 @@
             </a:ln>
             <a:extLst>
               <a:ext uri="{91240B29-F687-4f45-9708-019B960494DF}">
-                <a14:hiddenLine xmlns:a14="http://schemas.microsoft.com/office/drawing/2010/main" xmlns="" w="9525">
+                <a14:hiddenLine xmlns="" xmlns:a14="http://schemas.microsoft.com/office/drawing/2010/main" w="9525">
                   <a:solidFill>
                     <a:srgbClr val="000000"/>
                   </a:solidFill>
@@ -640,7 +640,7 @@
             </a:ln>
             <a:extLst>
               <a:ext uri="{91240B29-F687-4f45-9708-019B960494DF}">
-                <a14:hiddenLine xmlns:a14="http://schemas.microsoft.com/office/drawing/2010/main" xmlns="" w="9525">
+                <a14:hiddenLine xmlns="" xmlns:a14="http://schemas.microsoft.com/office/drawing/2010/main" w="9525">
                   <a:solidFill>
                     <a:srgbClr val="000000"/>
                   </a:solidFill>
@@ -702,7 +702,7 @@
             </a:ln>
             <a:extLst>
               <a:ext uri="{91240B29-F687-4f45-9708-019B960494DF}">
-                <a14:hiddenLine xmlns:a14="http://schemas.microsoft.com/office/drawing/2010/main" xmlns="" w="9525">
+                <a14:hiddenLine xmlns="" xmlns:a14="http://schemas.microsoft.com/office/drawing/2010/main" w="9525">
                   <a:solidFill>
                     <a:srgbClr val="000000"/>
                   </a:solidFill>
@@ -792,7 +792,7 @@
             </a:ln>
             <a:extLst>
               <a:ext uri="{91240B29-F687-4f45-9708-019B960494DF}">
-                <a14:hiddenLine xmlns:a14="http://schemas.microsoft.com/office/drawing/2010/main" xmlns="" w="9525">
+                <a14:hiddenLine xmlns="" xmlns:a14="http://schemas.microsoft.com/office/drawing/2010/main" w="9525">
                   <a:solidFill>
                     <a:srgbClr val="000000"/>
                   </a:solidFill>
@@ -854,7 +854,7 @@
             </a:ln>
             <a:extLst>
               <a:ext uri="{91240B29-F687-4f45-9708-019B960494DF}">
-                <a14:hiddenLine xmlns:a14="http://schemas.microsoft.com/office/drawing/2010/main" xmlns="" w="9525">
+                <a14:hiddenLine xmlns="" xmlns:a14="http://schemas.microsoft.com/office/drawing/2010/main" w="9525">
                   <a:solidFill>
                     <a:srgbClr val="000000"/>
                   </a:solidFill>
@@ -916,7 +916,7 @@
             </a:ln>
             <a:extLst>
               <a:ext uri="{91240B29-F687-4f45-9708-019B960494DF}">
-                <a14:hiddenLine xmlns:a14="http://schemas.microsoft.com/office/drawing/2010/main" xmlns="" w="9525">
+                <a14:hiddenLine xmlns="" xmlns:a14="http://schemas.microsoft.com/office/drawing/2010/main" w="9525">
                   <a:solidFill>
                     <a:srgbClr val="000000"/>
                   </a:solidFill>
@@ -1006,7 +1006,7 @@
             </a:ln>
             <a:extLst>
               <a:ext uri="{91240B29-F687-4f45-9708-019B960494DF}">
-                <a14:hiddenLine xmlns:a14="http://schemas.microsoft.com/office/drawing/2010/main" xmlns="" w="9525">
+                <a14:hiddenLine xmlns="" xmlns:a14="http://schemas.microsoft.com/office/drawing/2010/main" w="9525">
                   <a:solidFill>
                     <a:srgbClr val="000000"/>
                   </a:solidFill>
@@ -1096,7 +1096,7 @@
             </a:ln>
             <a:extLst>
               <a:ext uri="{91240B29-F687-4f45-9708-019B960494DF}">
-                <a14:hiddenLine xmlns:a14="http://schemas.microsoft.com/office/drawing/2010/main" xmlns="" w="9525">
+                <a14:hiddenLine xmlns="" xmlns:a14="http://schemas.microsoft.com/office/drawing/2010/main" w="9525">
                   <a:solidFill>
                     <a:srgbClr val="000000"/>
                   </a:solidFill>
@@ -1158,7 +1158,7 @@
             </a:ln>
             <a:extLst>
               <a:ext uri="{91240B29-F687-4f45-9708-019B960494DF}">
-                <a14:hiddenLine xmlns:a14="http://schemas.microsoft.com/office/drawing/2010/main" xmlns="" w="9525">
+                <a14:hiddenLine xmlns="" xmlns:a14="http://schemas.microsoft.com/office/drawing/2010/main" w="9525">
                   <a:solidFill>
                     <a:srgbClr val="000000"/>
                   </a:solidFill>
@@ -1268,7 +1268,7 @@
             </a:ln>
             <a:extLst>
               <a:ext uri="{91240B29-F687-4f45-9708-019B960494DF}">
-                <a14:hiddenLine xmlns:a14="http://schemas.microsoft.com/office/drawing/2010/main" xmlns="" w="9525">
+                <a14:hiddenLine xmlns="" xmlns:a14="http://schemas.microsoft.com/office/drawing/2010/main" w="9525">
                   <a:solidFill>
                     <a:srgbClr val="000000"/>
                   </a:solidFill>
@@ -1330,7 +1330,7 @@
             </a:ln>
             <a:extLst>
               <a:ext uri="{91240B29-F687-4f45-9708-019B960494DF}">
-                <a14:hiddenLine xmlns:a14="http://schemas.microsoft.com/office/drawing/2010/main" xmlns="" w="9525">
+                <a14:hiddenLine xmlns="" xmlns:a14="http://schemas.microsoft.com/office/drawing/2010/main" w="9525">
                   <a:solidFill>
                     <a:srgbClr val="000000"/>
                   </a:solidFill>
@@ -1420,7 +1420,7 @@
             </a:ln>
             <a:extLst>
               <a:ext uri="{91240B29-F687-4f45-9708-019B960494DF}">
-                <a14:hiddenLine xmlns:a14="http://schemas.microsoft.com/office/drawing/2010/main" xmlns="" w="9525">
+                <a14:hiddenLine xmlns="" xmlns:a14="http://schemas.microsoft.com/office/drawing/2010/main" w="9525">
                   <a:solidFill>
                     <a:srgbClr val="000000"/>
                   </a:solidFill>
@@ -1510,7 +1510,7 @@
             </a:ln>
             <a:extLst>
               <a:ext uri="{91240B29-F687-4f45-9708-019B960494DF}">
-                <a14:hiddenLine xmlns:a14="http://schemas.microsoft.com/office/drawing/2010/main" xmlns="" w="9525">
+                <a14:hiddenLine xmlns="" xmlns:a14="http://schemas.microsoft.com/office/drawing/2010/main" w="9525">
                   <a:solidFill>
                     <a:srgbClr val="000000"/>
                   </a:solidFill>
@@ -1572,7 +1572,7 @@
             </a:ln>
             <a:extLst>
               <a:ext uri="{91240B29-F687-4f45-9708-019B960494DF}">
-                <a14:hiddenLine xmlns:a14="http://schemas.microsoft.com/office/drawing/2010/main" xmlns="" w="9525">
+                <a14:hiddenLine xmlns="" xmlns:a14="http://schemas.microsoft.com/office/drawing/2010/main" w="9525">
                   <a:solidFill>
                     <a:srgbClr val="000000"/>
                   </a:solidFill>
@@ -1662,7 +1662,7 @@
             </a:ln>
             <a:extLst>
               <a:ext uri="{91240B29-F687-4f45-9708-019B960494DF}">
-                <a14:hiddenLine xmlns:a14="http://schemas.microsoft.com/office/drawing/2010/main" xmlns="" w="9525">
+                <a14:hiddenLine xmlns="" xmlns:a14="http://schemas.microsoft.com/office/drawing/2010/main" w="9525">
                   <a:solidFill>
                     <a:srgbClr val="000000"/>
                   </a:solidFill>
@@ -1752,7 +1752,7 @@
             </a:ln>
             <a:extLst>
               <a:ext uri="{91240B29-F687-4f45-9708-019B960494DF}">
-                <a14:hiddenLine xmlns:a14="http://schemas.microsoft.com/office/drawing/2010/main" xmlns="" w="9525">
+                <a14:hiddenLine xmlns="" xmlns:a14="http://schemas.microsoft.com/office/drawing/2010/main" w="9525">
                   <a:solidFill>
                     <a:srgbClr val="000000"/>
                   </a:solidFill>
@@ -1808,7 +1808,7 @@
             </a:ln>
             <a:extLst>
               <a:ext uri="{91240B29-F687-4f45-9708-019B960494DF}">
-                <a14:hiddenLine xmlns:a14="http://schemas.microsoft.com/office/drawing/2010/main" xmlns="" w="9525">
+                <a14:hiddenLine xmlns="" xmlns:a14="http://schemas.microsoft.com/office/drawing/2010/main" w="9525">
                   <a:solidFill>
                     <a:srgbClr val="000000"/>
                   </a:solidFill>
@@ -1898,7 +1898,7 @@
             </a:ln>
             <a:extLst>
               <a:ext uri="{91240B29-F687-4f45-9708-019B960494DF}">
-                <a14:hiddenLine xmlns:a14="http://schemas.microsoft.com/office/drawing/2010/main" xmlns="" w="9525">
+                <a14:hiddenLine xmlns="" xmlns:a14="http://schemas.microsoft.com/office/drawing/2010/main" w="9525">
                   <a:solidFill>
                     <a:srgbClr val="000000"/>
                   </a:solidFill>
@@ -1954,7 +1954,7 @@
             </a:ln>
             <a:extLst>
               <a:ext uri="{91240B29-F687-4f45-9708-019B960494DF}">
-                <a14:hiddenLine xmlns:a14="http://schemas.microsoft.com/office/drawing/2010/main" xmlns="" w="9525">
+                <a14:hiddenLine xmlns="" xmlns:a14="http://schemas.microsoft.com/office/drawing/2010/main" w="9525">
                   <a:solidFill>
                     <a:srgbClr val="000000"/>
                   </a:solidFill>
@@ -2044,7 +2044,7 @@
             </a:ln>
             <a:extLst>
               <a:ext uri="{91240B29-F687-4f45-9708-019B960494DF}">
-                <a14:hiddenLine xmlns:a14="http://schemas.microsoft.com/office/drawing/2010/main" xmlns="" w="9525">
+                <a14:hiddenLine xmlns="" xmlns:a14="http://schemas.microsoft.com/office/drawing/2010/main" w="9525">
                   <a:solidFill>
                     <a:srgbClr val="000000"/>
                   </a:solidFill>
@@ -2112,7 +2112,7 @@
             </a:ln>
             <a:extLst>
               <a:ext uri="{91240B29-F687-4f45-9708-019B960494DF}">
-                <a14:hiddenLine xmlns:a14="http://schemas.microsoft.com/office/drawing/2010/main" xmlns="" w="9525">
+                <a14:hiddenLine xmlns="" xmlns:a14="http://schemas.microsoft.com/office/drawing/2010/main" w="9525">
                   <a:solidFill>
                     <a:srgbClr val="000000"/>
                   </a:solidFill>
@@ -2202,7 +2202,7 @@
             </a:ln>
             <a:extLst>
               <a:ext uri="{91240B29-F687-4f45-9708-019B960494DF}">
-                <a14:hiddenLine xmlns:a14="http://schemas.microsoft.com/office/drawing/2010/main" xmlns="" w="9525">
+                <a14:hiddenLine xmlns="" xmlns:a14="http://schemas.microsoft.com/office/drawing/2010/main" w="9525">
                   <a:solidFill>
                     <a:srgbClr val="000000"/>
                   </a:solidFill>
@@ -2270,7 +2270,7 @@
             </a:ln>
             <a:extLst>
               <a:ext uri="{91240B29-F687-4f45-9708-019B960494DF}">
-                <a14:hiddenLine xmlns:a14="http://schemas.microsoft.com/office/drawing/2010/main" xmlns="" w="9525">
+                <a14:hiddenLine xmlns="" xmlns:a14="http://schemas.microsoft.com/office/drawing/2010/main" w="9525">
                   <a:solidFill>
                     <a:srgbClr val="000000"/>
                   </a:solidFill>
@@ -2360,7 +2360,7 @@
             </a:ln>
             <a:extLst>
               <a:ext uri="{91240B29-F687-4f45-9708-019B960494DF}">
-                <a14:hiddenLine xmlns:a14="http://schemas.microsoft.com/office/drawing/2010/main" xmlns="" w="9525">
+                <a14:hiddenLine xmlns="" xmlns:a14="http://schemas.microsoft.com/office/drawing/2010/main" w="9525">
                   <a:solidFill>
                     <a:srgbClr val="000000"/>
                   </a:solidFill>
@@ -2394,7 +2394,7 @@
             </a:ln>
             <a:extLst>
               <a:ext uri="{91240B29-F687-4f45-9708-019B960494DF}">
-                <a14:hiddenLine xmlns:a14="http://schemas.microsoft.com/office/drawing/2010/main" xmlns="" w="9525">
+                <a14:hiddenLine xmlns="" xmlns:a14="http://schemas.microsoft.com/office/drawing/2010/main" w="9525">
                   <a:solidFill>
                     <a:srgbClr val="000000"/>
                   </a:solidFill>
@@ -2484,7 +2484,7 @@
             </a:ln>
             <a:extLst>
               <a:ext uri="{91240B29-F687-4f45-9708-019B960494DF}">
-                <a14:hiddenLine xmlns:a14="http://schemas.microsoft.com/office/drawing/2010/main" xmlns="" w="9525">
+                <a14:hiddenLine xmlns="" xmlns:a14="http://schemas.microsoft.com/office/drawing/2010/main" w="9525">
                   <a:solidFill>
                     <a:srgbClr val="000000"/>
                   </a:solidFill>
@@ -2546,7 +2546,7 @@
             </a:ln>
             <a:extLst>
               <a:ext uri="{91240B29-F687-4f45-9708-019B960494DF}">
-                <a14:hiddenLine xmlns:a14="http://schemas.microsoft.com/office/drawing/2010/main" xmlns="" w="9525">
+                <a14:hiddenLine xmlns="" xmlns:a14="http://schemas.microsoft.com/office/drawing/2010/main" w="9525">
                   <a:solidFill>
                     <a:srgbClr val="000000"/>
                   </a:solidFill>
@@ -2608,7 +2608,7 @@
             </a:ln>
             <a:extLst>
               <a:ext uri="{91240B29-F687-4f45-9708-019B960494DF}">
-                <a14:hiddenLine xmlns:a14="http://schemas.microsoft.com/office/drawing/2010/main" xmlns="" w="9525">
+                <a14:hiddenLine xmlns="" xmlns:a14="http://schemas.microsoft.com/office/drawing/2010/main" w="9525">
                   <a:solidFill>
                     <a:srgbClr val="000000"/>
                   </a:solidFill>
@@ -2698,7 +2698,7 @@
             </a:ln>
             <a:extLst>
               <a:ext uri="{91240B29-F687-4f45-9708-019B960494DF}">
-                <a14:hiddenLine xmlns:a14="http://schemas.microsoft.com/office/drawing/2010/main" xmlns="" w="9525">
+                <a14:hiddenLine xmlns="" xmlns:a14="http://schemas.microsoft.com/office/drawing/2010/main" w="9525">
                   <a:solidFill>
                     <a:srgbClr val="000000"/>
                   </a:solidFill>
@@ -2766,7 +2766,7 @@
             </a:ln>
             <a:extLst>
               <a:ext uri="{91240B29-F687-4f45-9708-019B960494DF}">
-                <a14:hiddenLine xmlns:a14="http://schemas.microsoft.com/office/drawing/2010/main" xmlns="" w="9525">
+                <a14:hiddenLine xmlns="" xmlns:a14="http://schemas.microsoft.com/office/drawing/2010/main" w="9525">
                   <a:solidFill>
                     <a:srgbClr val="000000"/>
                   </a:solidFill>
@@ -2828,7 +2828,7 @@
             </a:ln>
             <a:extLst>
               <a:ext uri="{91240B29-F687-4f45-9708-019B960494DF}">
-                <a14:hiddenLine xmlns:a14="http://schemas.microsoft.com/office/drawing/2010/main" xmlns="" w="9525">
+                <a14:hiddenLine xmlns="" xmlns:a14="http://schemas.microsoft.com/office/drawing/2010/main" w="9525">
                   <a:solidFill>
                     <a:srgbClr val="000000"/>
                   </a:solidFill>
@@ -2918,7 +2918,7 @@
             </a:ln>
             <a:extLst>
               <a:ext uri="{91240B29-F687-4f45-9708-019B960494DF}">
-                <a14:hiddenLine xmlns:a14="http://schemas.microsoft.com/office/drawing/2010/main" xmlns="" w="9525">
+                <a14:hiddenLine xmlns="" xmlns:a14="http://schemas.microsoft.com/office/drawing/2010/main" w="9525">
                   <a:solidFill>
                     <a:srgbClr val="000000"/>
                   </a:solidFill>
@@ -2980,7 +2980,7 @@
             </a:ln>
             <a:extLst>
               <a:ext uri="{91240B29-F687-4f45-9708-019B960494DF}">
-                <a14:hiddenLine xmlns:a14="http://schemas.microsoft.com/office/drawing/2010/main" xmlns="" w="9525">
+                <a14:hiddenLine xmlns="" xmlns:a14="http://schemas.microsoft.com/office/drawing/2010/main" w="9525">
                   <a:solidFill>
                     <a:srgbClr val="000000"/>
                   </a:solidFill>
@@ -3070,7 +3070,7 @@
             </a:ln>
             <a:extLst>
               <a:ext uri="{91240B29-F687-4f45-9708-019B960494DF}">
-                <a14:hiddenLine xmlns:a14="http://schemas.microsoft.com/office/drawing/2010/main" xmlns="" w="9525">
+                <a14:hiddenLine xmlns="" xmlns:a14="http://schemas.microsoft.com/office/drawing/2010/main" w="9525">
                   <a:solidFill>
                     <a:srgbClr val="000000"/>
                   </a:solidFill>
@@ -3132,7 +3132,7 @@
             </a:ln>
             <a:extLst>
               <a:ext uri="{91240B29-F687-4f45-9708-019B960494DF}">
-                <a14:hiddenLine xmlns:a14="http://schemas.microsoft.com/office/drawing/2010/main" xmlns="" w="9525">
+                <a14:hiddenLine xmlns="" xmlns:a14="http://schemas.microsoft.com/office/drawing/2010/main" w="9525">
                   <a:solidFill>
                     <a:srgbClr val="000000"/>
                   </a:solidFill>
@@ -3222,7 +3222,7 @@
             </a:ln>
             <a:extLst>
               <a:ext uri="{91240B29-F687-4f45-9708-019B960494DF}">
-                <a14:hiddenLine xmlns:a14="http://schemas.microsoft.com/office/drawing/2010/main" xmlns="" w="9525">
+                <a14:hiddenLine xmlns="" xmlns:a14="http://schemas.microsoft.com/office/drawing/2010/main" w="9525">
                   <a:solidFill>
                     <a:srgbClr val="000000"/>
                   </a:solidFill>
@@ -3256,7 +3256,7 @@
             </a:ln>
             <a:extLst>
               <a:ext uri="{91240B29-F687-4f45-9708-019B960494DF}">
-                <a14:hiddenLine xmlns:a14="http://schemas.microsoft.com/office/drawing/2010/main" xmlns="" w="9525">
+                <a14:hiddenLine xmlns="" xmlns:a14="http://schemas.microsoft.com/office/drawing/2010/main" w="9525">
                   <a:solidFill>
                     <a:srgbClr val="000000"/>
                   </a:solidFill>
@@ -3321,7 +3321,7 @@
             </a:ln>
             <a:extLst>
               <a:ext uri="{91240B29-F687-4f45-9708-019B960494DF}">
-                <a14:hiddenLine xmlns:a14="http://schemas.microsoft.com/office/drawing/2010/main" xmlns="" w="9525">
+                <a14:hiddenLine xmlns="" xmlns:a14="http://schemas.microsoft.com/office/drawing/2010/main" w="9525">
                   <a:solidFill>
                     <a:srgbClr val="000000"/>
                   </a:solidFill>
@@ -3411,7 +3411,7 @@
             </a:ln>
             <a:extLst>
               <a:ext uri="{91240B29-F687-4f45-9708-019B960494DF}">
-                <a14:hiddenLine xmlns:a14="http://schemas.microsoft.com/office/drawing/2010/main" xmlns="" w="9525">
+                <a14:hiddenLine xmlns="" xmlns:a14="http://schemas.microsoft.com/office/drawing/2010/main" w="9525">
                   <a:solidFill>
                     <a:srgbClr val="000000"/>
                   </a:solidFill>
@@ -3473,7 +3473,7 @@
             </a:ln>
             <a:extLst>
               <a:ext uri="{91240B29-F687-4f45-9708-019B960494DF}">
-                <a14:hiddenLine xmlns:a14="http://schemas.microsoft.com/office/drawing/2010/main" xmlns="" w="9525">
+                <a14:hiddenLine xmlns="" xmlns:a14="http://schemas.microsoft.com/office/drawing/2010/main" w="9525">
                   <a:solidFill>
                     <a:srgbClr val="000000"/>
                   </a:solidFill>
@@ -3563,7 +3563,7 @@
             </a:ln>
             <a:extLst>
               <a:ext uri="{91240B29-F687-4f45-9708-019B960494DF}">
-                <a14:hiddenLine xmlns:a14="http://schemas.microsoft.com/office/drawing/2010/main" xmlns="" w="9525">
+                <a14:hiddenLine xmlns="" xmlns:a14="http://schemas.microsoft.com/office/drawing/2010/main" w="9525">
                   <a:solidFill>
                     <a:srgbClr val="000000"/>
                   </a:solidFill>
@@ -3653,7 +3653,7 @@
             </a:ln>
             <a:extLst>
               <a:ext uri="{91240B29-F687-4f45-9708-019B960494DF}">
-                <a14:hiddenLine xmlns:a14="http://schemas.microsoft.com/office/drawing/2010/main" xmlns="" w="9525">
+                <a14:hiddenLine xmlns="" xmlns:a14="http://schemas.microsoft.com/office/drawing/2010/main" w="9525">
                   <a:solidFill>
                     <a:srgbClr val="000000"/>
                   </a:solidFill>
@@ -3718,7 +3718,7 @@
             </a:ln>
             <a:extLst>
               <a:ext uri="{91240B29-F687-4f45-9708-019B960494DF}">
-                <a14:hiddenLine xmlns:a14="http://schemas.microsoft.com/office/drawing/2010/main" xmlns="" w="9525">
+                <a14:hiddenLine xmlns="" xmlns:a14="http://schemas.microsoft.com/office/drawing/2010/main" w="9525">
                   <a:solidFill>
                     <a:srgbClr val="000000"/>
                   </a:solidFill>
@@ -3780,7 +3780,7 @@
             </a:ln>
             <a:extLst>
               <a:ext uri="{91240B29-F687-4f45-9708-019B960494DF}">
-                <a14:hiddenLine xmlns:a14="http://schemas.microsoft.com/office/drawing/2010/main" xmlns="" w="9525">
+                <a14:hiddenLine xmlns="" xmlns:a14="http://schemas.microsoft.com/office/drawing/2010/main" w="9525">
                   <a:solidFill>
                     <a:srgbClr val="000000"/>
                   </a:solidFill>
@@ -3870,7 +3870,7 @@
             </a:ln>
             <a:extLst>
               <a:ext uri="{91240B29-F687-4f45-9708-019B960494DF}">
-                <a14:hiddenLine xmlns:a14="http://schemas.microsoft.com/office/drawing/2010/main" xmlns="" w="9525">
+                <a14:hiddenLine xmlns="" xmlns:a14="http://schemas.microsoft.com/office/drawing/2010/main" w="9525">
                   <a:solidFill>
                     <a:srgbClr val="000000"/>
                   </a:solidFill>
@@ -3960,7 +3960,7 @@
             </a:ln>
             <a:extLst>
               <a:ext uri="{91240B29-F687-4f45-9708-019B960494DF}">
-                <a14:hiddenLine xmlns:a14="http://schemas.microsoft.com/office/drawing/2010/main" xmlns="" w="9525">
+                <a14:hiddenLine xmlns="" xmlns:a14="http://schemas.microsoft.com/office/drawing/2010/main" w="9525">
                   <a:solidFill>
                     <a:srgbClr val="000000"/>
                   </a:solidFill>
@@ -4022,7 +4022,7 @@
             </a:ln>
             <a:extLst>
               <a:ext uri="{91240B29-F687-4f45-9708-019B960494DF}">
-                <a14:hiddenLine xmlns:a14="http://schemas.microsoft.com/office/drawing/2010/main" xmlns="" w="9525">
+                <a14:hiddenLine xmlns="" xmlns:a14="http://schemas.microsoft.com/office/drawing/2010/main" w="9525">
                   <a:solidFill>
                     <a:srgbClr val="000000"/>
                   </a:solidFill>
@@ -4142,7 +4142,7 @@
             </a:ln>
             <a:extLst>
               <a:ext uri="{91240B29-F687-4f45-9708-019B960494DF}">
-                <a14:hiddenLine xmlns:a14="http://schemas.microsoft.com/office/drawing/2010/main" xmlns="" w="9525">
+                <a14:hiddenLine xmlns="" xmlns:a14="http://schemas.microsoft.com/office/drawing/2010/main" w="9525">
                   <a:solidFill>
                     <a:srgbClr val="000000"/>
                   </a:solidFill>
@@ -4210,7 +4210,7 @@
             </a:ln>
             <a:extLst>
               <a:ext uri="{91240B29-F687-4f45-9708-019B960494DF}">
-                <a14:hiddenLine xmlns:a14="http://schemas.microsoft.com/office/drawing/2010/main" xmlns="" w="9525">
+                <a14:hiddenLine xmlns="" xmlns:a14="http://schemas.microsoft.com/office/drawing/2010/main" w="9525">
                   <a:solidFill>
                     <a:srgbClr val="000000"/>
                   </a:solidFill>
@@ -4300,7 +4300,7 @@
             </a:ln>
             <a:extLst>
               <a:ext uri="{91240B29-F687-4f45-9708-019B960494DF}">
-                <a14:hiddenLine xmlns:a14="http://schemas.microsoft.com/office/drawing/2010/main" xmlns="" w="9525">
+                <a14:hiddenLine xmlns="" xmlns:a14="http://schemas.microsoft.com/office/drawing/2010/main" w="9525">
                   <a:solidFill>
                     <a:srgbClr val="000000"/>
                   </a:solidFill>
@@ -4440,7 +4440,7 @@
           <a:p>
             <a:fld id="{48A87A34-81AB-432B-8DAE-1953F412C126}" type="datetimeFigureOut">
               <a:rPr lang="en-US" dirty="0"/>
-              <a:t>2/14/2017</a:t>
+              <a:t>4/10/2017</a:t>
             </a:fld>
             <a:endParaRPr lang="en-US" dirty="0"/>
           </a:p>
@@ -4702,7 +4702,7 @@
           <a:p>
             <a:fld id="{48A87A34-81AB-432B-8DAE-1953F412C126}" type="datetimeFigureOut">
               <a:rPr lang="en-US" dirty="0"/>
-              <a:t>2/14/2017</a:t>
+              <a:t>4/10/2017</a:t>
             </a:fld>
             <a:endParaRPr lang="en-US" dirty="0"/>
           </a:p>
@@ -4893,7 +4893,7 @@
           <a:p>
             <a:fld id="{48A87A34-81AB-432B-8DAE-1953F412C126}" type="datetimeFigureOut">
               <a:rPr lang="en-US" dirty="0"/>
-              <a:t>2/14/2017</a:t>
+              <a:t>4/10/2017</a:t>
             </a:fld>
             <a:endParaRPr lang="en-US" dirty="0"/>
           </a:p>
@@ -5151,7 +5151,7 @@
           <a:p>
             <a:fld id="{48A87A34-81AB-432B-8DAE-1953F412C126}" type="datetimeFigureOut">
               <a:rPr lang="en-US" dirty="0"/>
-              <a:t>2/14/2017</a:t>
+              <a:t>4/10/2017</a:t>
             </a:fld>
             <a:endParaRPr lang="en-US" dirty="0"/>
           </a:p>
@@ -5580,7 +5580,7 @@
           <a:p>
             <a:fld id="{48A87A34-81AB-432B-8DAE-1953F412C126}" type="datetimeFigureOut">
               <a:rPr lang="en-US" dirty="0"/>
-              <a:t>2/14/2017</a:t>
+              <a:t>4/10/2017</a:t>
             </a:fld>
             <a:endParaRPr lang="en-US" dirty="0"/>
           </a:p>
@@ -6121,7 +6121,7 @@
           <a:p>
             <a:fld id="{48A87A34-81AB-432B-8DAE-1953F412C126}" type="datetimeFigureOut">
               <a:rPr lang="en-US" dirty="0"/>
-              <a:t>2/14/2017</a:t>
+              <a:t>4/10/2017</a:t>
             </a:fld>
             <a:endParaRPr lang="en-US" dirty="0"/>
           </a:p>
@@ -6836,7 +6836,7 @@
           <a:p>
             <a:fld id="{48A87A34-81AB-432B-8DAE-1953F412C126}" type="datetimeFigureOut">
               <a:rPr lang="en-US" dirty="0"/>
-              <a:t>2/14/2017</a:t>
+              <a:t>4/10/2017</a:t>
             </a:fld>
             <a:endParaRPr lang="en-US" dirty="0"/>
           </a:p>
@@ -7001,7 +7001,7 @@
           <a:p>
             <a:fld id="{48A87A34-81AB-432B-8DAE-1953F412C126}" type="datetimeFigureOut">
               <a:rPr lang="en-US" dirty="0"/>
-              <a:t>2/14/2017</a:t>
+              <a:t>4/10/2017</a:t>
             </a:fld>
             <a:endParaRPr lang="en-US" dirty="0"/>
           </a:p>
@@ -7176,7 +7176,7 @@
           <a:p>
             <a:fld id="{48A87A34-81AB-432B-8DAE-1953F412C126}" type="datetimeFigureOut">
               <a:rPr lang="en-US" dirty="0"/>
-              <a:t>2/14/2017</a:t>
+              <a:t>4/10/2017</a:t>
             </a:fld>
             <a:endParaRPr lang="en-US" dirty="0"/>
           </a:p>
@@ -7341,7 +7341,7 @@
           <a:p>
             <a:fld id="{48A87A34-81AB-432B-8DAE-1953F412C126}" type="datetimeFigureOut">
               <a:rPr lang="en-US" dirty="0"/>
-              <a:t>2/14/2017</a:t>
+              <a:t>4/10/2017</a:t>
             </a:fld>
             <a:endParaRPr lang="en-US" dirty="0"/>
           </a:p>
@@ -7586,7 +7586,7 @@
           <a:p>
             <a:fld id="{48A87A34-81AB-432B-8DAE-1953F412C126}" type="datetimeFigureOut">
               <a:rPr lang="en-US" dirty="0"/>
-              <a:t>2/14/2017</a:t>
+              <a:t>4/10/2017</a:t>
             </a:fld>
             <a:endParaRPr lang="en-US" dirty="0"/>
           </a:p>
@@ -7813,7 +7813,7 @@
           <a:p>
             <a:fld id="{48A87A34-81AB-432B-8DAE-1953F412C126}" type="datetimeFigureOut">
               <a:rPr lang="en-US" dirty="0"/>
-              <a:t>2/14/2017</a:t>
+              <a:t>4/10/2017</a:t>
             </a:fld>
             <a:endParaRPr lang="en-US" dirty="0"/>
           </a:p>
@@ -8189,7 +8189,7 @@
           <a:p>
             <a:fld id="{48A87A34-81AB-432B-8DAE-1953F412C126}" type="datetimeFigureOut">
               <a:rPr lang="en-US" dirty="0"/>
-              <a:t>2/14/2017</a:t>
+              <a:t>4/10/2017</a:t>
             </a:fld>
             <a:endParaRPr lang="en-US" dirty="0"/>
           </a:p>
@@ -8302,7 +8302,7 @@
           <a:p>
             <a:fld id="{48A87A34-81AB-432B-8DAE-1953F412C126}" type="datetimeFigureOut">
               <a:rPr lang="en-US" dirty="0"/>
-              <a:t>2/14/2017</a:t>
+              <a:t>4/10/2017</a:t>
             </a:fld>
             <a:endParaRPr lang="en-US" dirty="0"/>
           </a:p>
@@ -8392,7 +8392,7 @@
           <a:p>
             <a:fld id="{48A87A34-81AB-432B-8DAE-1953F412C126}" type="datetimeFigureOut">
               <a:rPr lang="en-US" dirty="0"/>
-              <a:t>2/14/2017</a:t>
+              <a:t>4/10/2017</a:t>
             </a:fld>
             <a:endParaRPr lang="en-US" dirty="0"/>
           </a:p>
@@ -8636,7 +8636,7 @@
           <a:p>
             <a:fld id="{48A87A34-81AB-432B-8DAE-1953F412C126}" type="datetimeFigureOut">
               <a:rPr lang="en-US" dirty="0"/>
-              <a:t>2/14/2017</a:t>
+              <a:t>4/10/2017</a:t>
             </a:fld>
             <a:endParaRPr lang="en-US" dirty="0"/>
           </a:p>
@@ -8911,7 +8911,7 @@
           <a:p>
             <a:fld id="{48A87A34-81AB-432B-8DAE-1953F412C126}" type="datetimeFigureOut">
               <a:rPr lang="en-US" dirty="0"/>
-              <a:t>2/14/2017</a:t>
+              <a:t>4/10/2017</a:t>
             </a:fld>
             <a:endParaRPr lang="en-US" dirty="0"/>
           </a:p>
@@ -9029,7 +9029,7 @@
           <a:noFill/>
           <a:extLst>
             <a:ext uri="{909E8E84-426E-40dd-AFC4-6F175D3DCCD1}">
-              <a14:hiddenFill xmlns:a14="http://schemas.microsoft.com/office/drawing/2010/main" xmlns="">
+              <a14:hiddenFill xmlns="" xmlns:a14="http://schemas.microsoft.com/office/drawing/2010/main">
                 <a:solidFill>
                   <a:srgbClr val="FFFFFF"/>
                 </a:solidFill>
@@ -9103,7 +9103,7 @@
               </a:ln>
               <a:extLst>
                 <a:ext uri="{91240B29-F687-4f45-9708-019B960494DF}">
-                  <a14:hiddenLine xmlns:a14="http://schemas.microsoft.com/office/drawing/2010/main" xmlns="" w="9525">
+                  <a14:hiddenLine xmlns="" xmlns:a14="http://schemas.microsoft.com/office/drawing/2010/main" w="9525">
                     <a:solidFill>
                       <a:srgbClr val="000000"/>
                     </a:solidFill>
@@ -9193,7 +9193,7 @@
               </a:ln>
               <a:extLst>
                 <a:ext uri="{91240B29-F687-4f45-9708-019B960494DF}">
-                  <a14:hiddenLine xmlns:a14="http://schemas.microsoft.com/office/drawing/2010/main" xmlns="" w="9525">
+                  <a14:hiddenLine xmlns="" xmlns:a14="http://schemas.microsoft.com/office/drawing/2010/main" w="9525">
                     <a:solidFill>
                       <a:srgbClr val="000000"/>
                     </a:solidFill>
@@ -9283,7 +9283,7 @@
               </a:ln>
               <a:extLst>
                 <a:ext uri="{91240B29-F687-4f45-9708-019B960494DF}">
-                  <a14:hiddenLine xmlns:a14="http://schemas.microsoft.com/office/drawing/2010/main" xmlns="" w="9525">
+                  <a14:hiddenLine xmlns="" xmlns:a14="http://schemas.microsoft.com/office/drawing/2010/main" w="9525">
                     <a:solidFill>
                       <a:srgbClr val="000000"/>
                     </a:solidFill>
@@ -9345,7 +9345,7 @@
               </a:ln>
               <a:extLst>
                 <a:ext uri="{91240B29-F687-4f45-9708-019B960494DF}">
-                  <a14:hiddenLine xmlns:a14="http://schemas.microsoft.com/office/drawing/2010/main" xmlns="" w="9525">
+                  <a14:hiddenLine xmlns="" xmlns:a14="http://schemas.microsoft.com/office/drawing/2010/main" w="9525">
                     <a:solidFill>
                       <a:srgbClr val="000000"/>
                     </a:solidFill>
@@ -9435,7 +9435,7 @@
               </a:ln>
               <a:extLst>
                 <a:ext uri="{91240B29-F687-4f45-9708-019B960494DF}">
-                  <a14:hiddenLine xmlns:a14="http://schemas.microsoft.com/office/drawing/2010/main" xmlns="" w="9525">
+                  <a14:hiddenLine xmlns="" xmlns:a14="http://schemas.microsoft.com/office/drawing/2010/main" w="9525">
                     <a:solidFill>
                       <a:srgbClr val="000000"/>
                     </a:solidFill>
@@ -9497,7 +9497,7 @@
               </a:ln>
               <a:extLst>
                 <a:ext uri="{91240B29-F687-4f45-9708-019B960494DF}">
-                  <a14:hiddenLine xmlns:a14="http://schemas.microsoft.com/office/drawing/2010/main" xmlns="" w="9525">
+                  <a14:hiddenLine xmlns="" xmlns:a14="http://schemas.microsoft.com/office/drawing/2010/main" w="9525">
                     <a:solidFill>
                       <a:srgbClr val="000000"/>
                     </a:solidFill>
@@ -9559,7 +9559,7 @@
               </a:ln>
               <a:extLst>
                 <a:ext uri="{91240B29-F687-4f45-9708-019B960494DF}">
-                  <a14:hiddenLine xmlns:a14="http://schemas.microsoft.com/office/drawing/2010/main" xmlns="" w="9525">
+                  <a14:hiddenLine xmlns="" xmlns:a14="http://schemas.microsoft.com/office/drawing/2010/main" w="9525">
                     <a:solidFill>
                       <a:srgbClr val="000000"/>
                     </a:solidFill>
@@ -9649,7 +9649,7 @@
               </a:ln>
               <a:extLst>
                 <a:ext uri="{91240B29-F687-4f45-9708-019B960494DF}">
-                  <a14:hiddenLine xmlns:a14="http://schemas.microsoft.com/office/drawing/2010/main" xmlns="" w="9525">
+                  <a14:hiddenLine xmlns="" xmlns:a14="http://schemas.microsoft.com/office/drawing/2010/main" w="9525">
                     <a:solidFill>
                       <a:srgbClr val="000000"/>
                     </a:solidFill>
@@ -9739,7 +9739,7 @@
               </a:ln>
               <a:extLst>
                 <a:ext uri="{91240B29-F687-4f45-9708-019B960494DF}">
-                  <a14:hiddenLine xmlns:a14="http://schemas.microsoft.com/office/drawing/2010/main" xmlns="" w="9525">
+                  <a14:hiddenLine xmlns="" xmlns:a14="http://schemas.microsoft.com/office/drawing/2010/main" w="9525">
                     <a:solidFill>
                       <a:srgbClr val="000000"/>
                     </a:solidFill>
@@ -9801,7 +9801,7 @@
               </a:ln>
               <a:extLst>
                 <a:ext uri="{91240B29-F687-4f45-9708-019B960494DF}">
-                  <a14:hiddenLine xmlns:a14="http://schemas.microsoft.com/office/drawing/2010/main" xmlns="" w="9525">
+                  <a14:hiddenLine xmlns="" xmlns:a14="http://schemas.microsoft.com/office/drawing/2010/main" w="9525">
                     <a:solidFill>
                       <a:srgbClr val="000000"/>
                     </a:solidFill>
@@ -9911,7 +9911,7 @@
               </a:ln>
               <a:extLst>
                 <a:ext uri="{91240B29-F687-4f45-9708-019B960494DF}">
-                  <a14:hiddenLine xmlns:a14="http://schemas.microsoft.com/office/drawing/2010/main" xmlns="" w="9525">
+                  <a14:hiddenLine xmlns="" xmlns:a14="http://schemas.microsoft.com/office/drawing/2010/main" w="9525">
                     <a:solidFill>
                       <a:srgbClr val="000000"/>
                     </a:solidFill>
@@ -9995,7 +9995,7 @@
               </a:ln>
               <a:extLst>
                 <a:ext uri="{91240B29-F687-4f45-9708-019B960494DF}">
-                  <a14:hiddenLine xmlns:a14="http://schemas.microsoft.com/office/drawing/2010/main" xmlns="" w="9525">
+                  <a14:hiddenLine xmlns="" xmlns:a14="http://schemas.microsoft.com/office/drawing/2010/main" w="9525">
                     <a:solidFill>
                       <a:srgbClr val="000000"/>
                     </a:solidFill>
@@ -10057,7 +10057,7 @@
               </a:ln>
               <a:extLst>
                 <a:ext uri="{91240B29-F687-4f45-9708-019B960494DF}">
-                  <a14:hiddenLine xmlns:a14="http://schemas.microsoft.com/office/drawing/2010/main" xmlns="" w="9525">
+                  <a14:hiddenLine xmlns="" xmlns:a14="http://schemas.microsoft.com/office/drawing/2010/main" w="9525">
                     <a:solidFill>
                       <a:srgbClr val="000000"/>
                     </a:solidFill>
@@ -10119,7 +10119,7 @@
               </a:ln>
               <a:extLst>
                 <a:ext uri="{91240B29-F687-4f45-9708-019B960494DF}">
-                  <a14:hiddenLine xmlns:a14="http://schemas.microsoft.com/office/drawing/2010/main" xmlns="" w="9525">
+                  <a14:hiddenLine xmlns="" xmlns:a14="http://schemas.microsoft.com/office/drawing/2010/main" w="9525">
                     <a:solidFill>
                       <a:srgbClr val="000000"/>
                     </a:solidFill>
@@ -10209,7 +10209,7 @@
               </a:ln>
               <a:extLst>
                 <a:ext uri="{91240B29-F687-4f45-9708-019B960494DF}">
-                  <a14:hiddenLine xmlns:a14="http://schemas.microsoft.com/office/drawing/2010/main" xmlns="" w="9525">
+                  <a14:hiddenLine xmlns="" xmlns:a14="http://schemas.microsoft.com/office/drawing/2010/main" w="9525">
                     <a:solidFill>
                       <a:srgbClr val="000000"/>
                     </a:solidFill>
@@ -10243,7 +10243,7 @@
               </a:ln>
               <a:extLst>
                 <a:ext uri="{91240B29-F687-4f45-9708-019B960494DF}">
-                  <a14:hiddenLine xmlns:a14="http://schemas.microsoft.com/office/drawing/2010/main" xmlns="" w="9525">
+                  <a14:hiddenLine xmlns="" xmlns:a14="http://schemas.microsoft.com/office/drawing/2010/main" w="9525">
                     <a:solidFill>
                       <a:srgbClr val="000000"/>
                     </a:solidFill>
@@ -10308,7 +10308,7 @@
               </a:ln>
               <a:extLst>
                 <a:ext uri="{91240B29-F687-4f45-9708-019B960494DF}">
-                  <a14:hiddenLine xmlns:a14="http://schemas.microsoft.com/office/drawing/2010/main" xmlns="" w="9525">
+                  <a14:hiddenLine xmlns="" xmlns:a14="http://schemas.microsoft.com/office/drawing/2010/main" w="9525">
                     <a:solidFill>
                       <a:srgbClr val="000000"/>
                     </a:solidFill>
@@ -10398,7 +10398,7 @@
               </a:ln>
               <a:extLst>
                 <a:ext uri="{91240B29-F687-4f45-9708-019B960494DF}">
-                  <a14:hiddenLine xmlns:a14="http://schemas.microsoft.com/office/drawing/2010/main" xmlns="" w="9525">
+                  <a14:hiddenLine xmlns="" xmlns:a14="http://schemas.microsoft.com/office/drawing/2010/main" w="9525">
                     <a:solidFill>
                       <a:srgbClr val="000000"/>
                     </a:solidFill>
@@ -10460,7 +10460,7 @@
               </a:ln>
               <a:extLst>
                 <a:ext uri="{91240B29-F687-4f45-9708-019B960494DF}">
-                  <a14:hiddenLine xmlns:a14="http://schemas.microsoft.com/office/drawing/2010/main" xmlns="" w="9525">
+                  <a14:hiddenLine xmlns="" xmlns:a14="http://schemas.microsoft.com/office/drawing/2010/main" w="9525">
                     <a:solidFill>
                       <a:srgbClr val="000000"/>
                     </a:solidFill>
@@ -10550,7 +10550,7 @@
               </a:ln>
               <a:extLst>
                 <a:ext uri="{91240B29-F687-4f45-9708-019B960494DF}">
-                  <a14:hiddenLine xmlns:a14="http://schemas.microsoft.com/office/drawing/2010/main" xmlns="" w="9525">
+                  <a14:hiddenLine xmlns="" xmlns:a14="http://schemas.microsoft.com/office/drawing/2010/main" w="9525">
                     <a:solidFill>
                       <a:srgbClr val="000000"/>
                     </a:solidFill>
@@ -10615,7 +10615,7 @@
               </a:ln>
               <a:extLst>
                 <a:ext uri="{91240B29-F687-4f45-9708-019B960494DF}">
-                  <a14:hiddenLine xmlns:a14="http://schemas.microsoft.com/office/drawing/2010/main" xmlns="" w="9525">
+                  <a14:hiddenLine xmlns="" xmlns:a14="http://schemas.microsoft.com/office/drawing/2010/main" w="9525">
                     <a:solidFill>
                       <a:srgbClr val="000000"/>
                     </a:solidFill>
@@ -10677,7 +10677,7 @@
               </a:ln>
               <a:extLst>
                 <a:ext uri="{91240B29-F687-4f45-9708-019B960494DF}">
-                  <a14:hiddenLine xmlns:a14="http://schemas.microsoft.com/office/drawing/2010/main" xmlns="" w="9525">
+                  <a14:hiddenLine xmlns="" xmlns:a14="http://schemas.microsoft.com/office/drawing/2010/main" w="9525">
                     <a:solidFill>
                       <a:srgbClr val="000000"/>
                     </a:solidFill>
@@ -10767,7 +10767,7 @@
               </a:ln>
               <a:extLst>
                 <a:ext uri="{91240B29-F687-4f45-9708-019B960494DF}">
-                  <a14:hiddenLine xmlns:a14="http://schemas.microsoft.com/office/drawing/2010/main" xmlns="" w="9525">
+                  <a14:hiddenLine xmlns="" xmlns:a14="http://schemas.microsoft.com/office/drawing/2010/main" w="9525">
                     <a:solidFill>
                       <a:srgbClr val="000000"/>
                     </a:solidFill>
@@ -10857,7 +10857,7 @@
               </a:ln>
               <a:extLst>
                 <a:ext uri="{91240B29-F687-4f45-9708-019B960494DF}">
-                  <a14:hiddenLine xmlns:a14="http://schemas.microsoft.com/office/drawing/2010/main" xmlns="" w="9525">
+                  <a14:hiddenLine xmlns="" xmlns:a14="http://schemas.microsoft.com/office/drawing/2010/main" w="9525">
                     <a:solidFill>
                       <a:srgbClr val="000000"/>
                     </a:solidFill>
@@ -10922,7 +10922,7 @@
               </a:ln>
               <a:extLst>
                 <a:ext uri="{91240B29-F687-4f45-9708-019B960494DF}">
-                  <a14:hiddenLine xmlns:a14="http://schemas.microsoft.com/office/drawing/2010/main" xmlns="" w="9525">
+                  <a14:hiddenLine xmlns="" xmlns:a14="http://schemas.microsoft.com/office/drawing/2010/main" w="9525">
                     <a:solidFill>
                       <a:srgbClr val="000000"/>
                     </a:solidFill>
@@ -11042,7 +11042,7 @@
               </a:ln>
               <a:extLst>
                 <a:ext uri="{91240B29-F687-4f45-9708-019B960494DF}">
-                  <a14:hiddenLine xmlns:a14="http://schemas.microsoft.com/office/drawing/2010/main" xmlns="" w="9525">
+                  <a14:hiddenLine xmlns="" xmlns:a14="http://schemas.microsoft.com/office/drawing/2010/main" w="9525">
                     <a:solidFill>
                       <a:srgbClr val="000000"/>
                     </a:solidFill>
@@ -11123,7 +11123,7 @@
               </a:ln>
               <a:extLst>
                 <a:ext uri="{91240B29-F687-4f45-9708-019B960494DF}">
-                  <a14:hiddenLine xmlns:a14="http://schemas.microsoft.com/office/drawing/2010/main" xmlns="" w="9525">
+                  <a14:hiddenLine xmlns="" xmlns:a14="http://schemas.microsoft.com/office/drawing/2010/main" w="9525">
                     <a:solidFill>
                       <a:srgbClr val="000000"/>
                     </a:solidFill>
@@ -11238,7 +11238,7 @@
               </a:ln>
               <a:extLst>
                 <a:ext uri="{91240B29-F687-4f45-9708-019B960494DF}">
-                  <a14:hiddenLine xmlns:a14="http://schemas.microsoft.com/office/drawing/2010/main" xmlns="" w="9525">
+                  <a14:hiddenLine xmlns="" xmlns:a14="http://schemas.microsoft.com/office/drawing/2010/main" w="9525">
                     <a:solidFill>
                       <a:srgbClr val="000000"/>
                     </a:solidFill>
@@ -11328,7 +11328,7 @@
               </a:ln>
               <a:extLst>
                 <a:ext uri="{91240B29-F687-4f45-9708-019B960494DF}">
-                  <a14:hiddenLine xmlns:a14="http://schemas.microsoft.com/office/drawing/2010/main" xmlns="" w="9525">
+                  <a14:hiddenLine xmlns="" xmlns:a14="http://schemas.microsoft.com/office/drawing/2010/main" w="9525">
                     <a:solidFill>
                       <a:srgbClr val="000000"/>
                     </a:solidFill>
@@ -11393,7 +11393,7 @@
               </a:ln>
               <a:extLst>
                 <a:ext uri="{91240B29-F687-4f45-9708-019B960494DF}">
-                  <a14:hiddenLine xmlns:a14="http://schemas.microsoft.com/office/drawing/2010/main" xmlns="" w="9525">
+                  <a14:hiddenLine xmlns="" xmlns:a14="http://schemas.microsoft.com/office/drawing/2010/main" w="9525">
                     <a:solidFill>
                       <a:srgbClr val="000000"/>
                     </a:solidFill>
@@ -11483,7 +11483,7 @@
               </a:ln>
               <a:extLst>
                 <a:ext uri="{91240B29-F687-4f45-9708-019B960494DF}">
-                  <a14:hiddenLine xmlns:a14="http://schemas.microsoft.com/office/drawing/2010/main" xmlns="" w="9525">
+                  <a14:hiddenLine xmlns="" xmlns:a14="http://schemas.microsoft.com/office/drawing/2010/main" w="9525">
                     <a:solidFill>
                       <a:srgbClr val="000000"/>
                     </a:solidFill>
@@ -11551,7 +11551,7 @@
               </a:ln>
               <a:extLst>
                 <a:ext uri="{91240B29-F687-4f45-9708-019B960494DF}">
-                  <a14:hiddenLine xmlns:a14="http://schemas.microsoft.com/office/drawing/2010/main" xmlns="" w="9525">
+                  <a14:hiddenLine xmlns="" xmlns:a14="http://schemas.microsoft.com/office/drawing/2010/main" w="9525">
                     <a:solidFill>
                       <a:srgbClr val="000000"/>
                     </a:solidFill>
@@ -11641,7 +11641,7 @@
               </a:ln>
               <a:extLst>
                 <a:ext uri="{91240B29-F687-4f45-9708-019B960494DF}">
-                  <a14:hiddenLine xmlns:a14="http://schemas.microsoft.com/office/drawing/2010/main" xmlns="" w="9525">
+                  <a14:hiddenLine xmlns="" xmlns:a14="http://schemas.microsoft.com/office/drawing/2010/main" w="9525">
                     <a:solidFill>
                       <a:srgbClr val="000000"/>
                     </a:solidFill>
@@ -11709,7 +11709,7 @@
               </a:ln>
               <a:extLst>
                 <a:ext uri="{91240B29-F687-4f45-9708-019B960494DF}">
-                  <a14:hiddenLine xmlns:a14="http://schemas.microsoft.com/office/drawing/2010/main" xmlns="" w="9525">
+                  <a14:hiddenLine xmlns="" xmlns:a14="http://schemas.microsoft.com/office/drawing/2010/main" w="9525">
                     <a:solidFill>
                       <a:srgbClr val="000000"/>
                     </a:solidFill>
@@ -11799,7 +11799,7 @@
               </a:ln>
               <a:extLst>
                 <a:ext uri="{91240B29-F687-4f45-9708-019B960494DF}">
-                  <a14:hiddenLine xmlns:a14="http://schemas.microsoft.com/office/drawing/2010/main" xmlns="" w="9525">
+                  <a14:hiddenLine xmlns="" xmlns:a14="http://schemas.microsoft.com/office/drawing/2010/main" w="9525">
                     <a:solidFill>
                       <a:srgbClr val="000000"/>
                     </a:solidFill>
@@ -11833,7 +11833,7 @@
               </a:ln>
               <a:extLst>
                 <a:ext uri="{91240B29-F687-4f45-9708-019B960494DF}">
-                  <a14:hiddenLine xmlns:a14="http://schemas.microsoft.com/office/drawing/2010/main" xmlns="" w="9525">
+                  <a14:hiddenLine xmlns="" xmlns:a14="http://schemas.microsoft.com/office/drawing/2010/main" w="9525">
                     <a:solidFill>
                       <a:srgbClr val="000000"/>
                     </a:solidFill>
@@ -11974,7 +11974,7 @@
             <a:fld id="{48A87A34-81AB-432B-8DAE-1953F412C126}" type="datetimeFigureOut">
               <a:rPr lang="en-US" dirty="0"/>
               <a:pPr/>
-              <a:t>2/14/2017</a:t>
+              <a:t>4/10/2017</a:t>
             </a:fld>
             <a:endParaRPr lang="en-US" dirty="0"/>
           </a:p>
@@ -25612,42 +25612,62 @@
               <a:buNone/>
             </a:pPr>
             <a:r>
-              <a:rPr lang="en-US" dirty="0"/>
+              <a:rPr lang="en-US" dirty="0">
+                <a:latin typeface="Consolas" panose="020B0609020204030204" pitchFamily="49" charset="0"/>
+              </a:rPr>
               <a:t>extern template </a:t>
             </a:r>
             <a:r>
-              <a:rPr lang="en-US" dirty="0" err="1"/>
+              <a:rPr lang="en-US" dirty="0" err="1">
+                <a:latin typeface="Consolas" panose="020B0609020204030204" pitchFamily="49" charset="0"/>
+              </a:rPr>
               <a:t>int</a:t>
             </a:r>
             <a:r>
-              <a:rPr lang="en-US" dirty="0"/>
+              <a:rPr lang="en-US" dirty="0">
+                <a:latin typeface="Consolas" panose="020B0609020204030204" pitchFamily="49" charset="0"/>
+              </a:rPr>
               <a:t> max&lt;</a:t>
             </a:r>
             <a:r>
-              <a:rPr lang="en-US" dirty="0" err="1"/>
+              <a:rPr lang="en-US" dirty="0" err="1">
+                <a:latin typeface="Consolas" panose="020B0609020204030204" pitchFamily="49" charset="0"/>
+              </a:rPr>
               <a:t>int</a:t>
             </a:r>
             <a:r>
-              <a:rPr lang="en-US" dirty="0"/>
+              <a:rPr lang="en-US" dirty="0">
+                <a:latin typeface="Consolas" panose="020B0609020204030204" pitchFamily="49" charset="0"/>
+              </a:rPr>
               <a:t>&gt; (</a:t>
             </a:r>
             <a:r>
-              <a:rPr lang="en-US" dirty="0" err="1"/>
+              <a:rPr lang="en-US" dirty="0" err="1">
+                <a:latin typeface="Consolas" panose="020B0609020204030204" pitchFamily="49" charset="0"/>
+              </a:rPr>
               <a:t>int</a:t>
             </a:r>
             <a:r>
-              <a:rPr lang="en-US" dirty="0"/>
+              <a:rPr lang="en-US" dirty="0">
+                <a:latin typeface="Consolas" panose="020B0609020204030204" pitchFamily="49" charset="0"/>
+              </a:rPr>
               <a:t>, </a:t>
             </a:r>
             <a:r>
-              <a:rPr lang="en-US" dirty="0" err="1"/>
+              <a:rPr lang="en-US" dirty="0" err="1">
+                <a:latin typeface="Consolas" panose="020B0609020204030204" pitchFamily="49" charset="0"/>
+              </a:rPr>
               <a:t>int</a:t>
             </a:r>
             <a:r>
-              <a:rPr lang="en-US" dirty="0" smtClean="0"/>
+              <a:rPr lang="en-US" dirty="0" smtClean="0">
+                <a:latin typeface="Consolas" panose="020B0609020204030204" pitchFamily="49" charset="0"/>
+              </a:rPr>
               <a:t>);</a:t>
             </a:r>
-            <a:endParaRPr lang="ru-RU" dirty="0" smtClean="0"/>
+            <a:endParaRPr lang="ru-RU" dirty="0" smtClean="0">
+              <a:latin typeface="Consolas" panose="020B0609020204030204" pitchFamily="49" charset="0"/>
+            </a:endParaRPr>
           </a:p>
           <a:p>
             <a:pPr marL="0" indent="0">
@@ -25663,46 +25683,68 @@
               <a:buNone/>
             </a:pPr>
             <a:r>
-              <a:rPr lang="fr-FR" dirty="0" err="1"/>
+              <a:rPr lang="fr-FR" dirty="0" err="1">
+                <a:latin typeface="Consolas" panose="020B0609020204030204" pitchFamily="49" charset="0"/>
+              </a:rPr>
               <a:t>template</a:t>
             </a:r>
             <a:r>
-              <a:rPr lang="fr-FR" dirty="0"/>
+              <a:rPr lang="fr-FR" dirty="0">
+                <a:latin typeface="Consolas" panose="020B0609020204030204" pitchFamily="49" charset="0"/>
+              </a:rPr>
               <a:t> </a:t>
             </a:r>
             <a:r>
-              <a:rPr lang="fr-FR" dirty="0" err="1"/>
+              <a:rPr lang="fr-FR" dirty="0" err="1">
+                <a:latin typeface="Consolas" panose="020B0609020204030204" pitchFamily="49" charset="0"/>
+              </a:rPr>
               <a:t>int</a:t>
             </a:r>
             <a:r>
-              <a:rPr lang="fr-FR" dirty="0"/>
+              <a:rPr lang="fr-FR" dirty="0">
+                <a:latin typeface="Consolas" panose="020B0609020204030204" pitchFamily="49" charset="0"/>
+              </a:rPr>
               <a:t> max&lt;</a:t>
             </a:r>
             <a:r>
-              <a:rPr lang="fr-FR" dirty="0" err="1"/>
+              <a:rPr lang="fr-FR" dirty="0" err="1">
+                <a:latin typeface="Consolas" panose="020B0609020204030204" pitchFamily="49" charset="0"/>
+              </a:rPr>
               <a:t>int</a:t>
             </a:r>
             <a:r>
-              <a:rPr lang="fr-FR" dirty="0"/>
+              <a:rPr lang="fr-FR" dirty="0">
+                <a:latin typeface="Consolas" panose="020B0609020204030204" pitchFamily="49" charset="0"/>
+              </a:rPr>
               <a:t>&gt;(</a:t>
             </a:r>
             <a:r>
-              <a:rPr lang="fr-FR" dirty="0" err="1"/>
+              <a:rPr lang="fr-FR" dirty="0" err="1">
+                <a:latin typeface="Consolas" panose="020B0609020204030204" pitchFamily="49" charset="0"/>
+              </a:rPr>
               <a:t>int</a:t>
             </a:r>
             <a:r>
-              <a:rPr lang="fr-FR" dirty="0"/>
+              <a:rPr lang="fr-FR" dirty="0">
+                <a:latin typeface="Consolas" panose="020B0609020204030204" pitchFamily="49" charset="0"/>
+              </a:rPr>
               <a:t>, </a:t>
             </a:r>
             <a:r>
-              <a:rPr lang="fr-FR" dirty="0" err="1"/>
+              <a:rPr lang="fr-FR" dirty="0" err="1">
+                <a:latin typeface="Consolas" panose="020B0609020204030204" pitchFamily="49" charset="0"/>
+              </a:rPr>
               <a:t>int</a:t>
             </a:r>
             <a:r>
-              <a:rPr lang="fr-FR" dirty="0"/>
+              <a:rPr lang="fr-FR" dirty="0">
+                <a:latin typeface="Consolas" panose="020B0609020204030204" pitchFamily="49" charset="0"/>
+              </a:rPr>
               <a:t>);</a:t>
             </a:r>
-            <a:endParaRPr lang="en-US" dirty="0"/>
+            <a:endParaRPr lang="en-US" dirty="0">
+              <a:latin typeface="Consolas" panose="020B0609020204030204" pitchFamily="49" charset="0"/>
+            </a:endParaRPr>
           </a:p>
         </p:txBody>
       </p:sp>

</xml_diff>